<commit_message>
color scheme is spooky
</commit_message>
<xml_diff>
--- a/poster_RobotMusic.pptx
+++ b/poster_RobotMusic.pptx
@@ -3510,20 +3510,20 @@
       </p:grpSpPr>
       <p:sp>
         <p:nvSpPr>
-          <p:cNvPr id="28" name="Rectangle 27"/>
+          <p:cNvPr id="19" name="Rectangle 18"/>
           <p:cNvSpPr/>
           <p:nvPr/>
         </p:nvSpPr>
         <p:spPr>
           <a:xfrm>
-            <a:off x="2743200" y="425080"/>
-            <a:ext cx="21945600" cy="1973652"/>
+            <a:off x="-25400" y="0"/>
+            <a:ext cx="27432000" cy="18288000"/>
           </a:xfrm>
           <a:prstGeom prst="rect">
             <a:avLst/>
           </a:prstGeom>
           <a:solidFill>
-            <a:srgbClr val="8C1515"/>
+            <a:srgbClr val="2E2E2E"/>
           </a:solidFill>
         </p:spPr>
         <p:style>
@@ -3553,44 +3553,49 @@
       </p:sp>
       <p:sp>
         <p:nvSpPr>
-          <p:cNvPr id="5" name="Rectangle 4"/>
+          <p:cNvPr id="28" name="Rectangle 27"/>
           <p:cNvSpPr/>
           <p:nvPr/>
         </p:nvSpPr>
         <p:spPr>
           <a:xfrm>
-            <a:off x="0" y="17018000"/>
-            <a:ext cx="27432000" cy="1270000"/>
+            <a:off x="2743200" y="425080"/>
+            <a:ext cx="21945600" cy="1973652"/>
           </a:xfrm>
           <a:prstGeom prst="rect">
             <a:avLst/>
           </a:prstGeom>
           <a:solidFill>
-            <a:srgbClr val="8C1515"/>
+            <a:srgbClr val="1B001E"/>
           </a:solidFill>
+          <a:ln w="76200">
+            <a:solidFill>
+              <a:srgbClr val="9E86C8"/>
+            </a:solidFill>
+          </a:ln>
         </p:spPr>
         <p:style>
           <a:lnRef idx="2">
-            <a:schemeClr val="accent4">
+            <a:schemeClr val="accent2">
               <a:shade val="50000"/>
             </a:schemeClr>
           </a:lnRef>
           <a:fillRef idx="1">
-            <a:schemeClr val="accent4"/>
+            <a:schemeClr val="accent2"/>
           </a:fillRef>
           <a:effectRef idx="0">
-            <a:schemeClr val="accent4"/>
+            <a:schemeClr val="accent2"/>
           </a:effectRef>
           <a:fontRef idx="minor">
             <a:schemeClr val="lt1"/>
           </a:fontRef>
         </p:style>
         <p:txBody>
-          <a:bodyPr lIns="66637" tIns="33318" rIns="66637" bIns="33318" rtlCol="0" anchor="ctr"/>
+          <a:bodyPr rtlCol="0" anchor="ctr"/>
           <a:lstStyle/>
           <a:p>
             <a:pPr algn="ctr"/>
-            <a:endParaRPr lang="en-US"/>
+            <a:endParaRPr lang="en-US" dirty="0"/>
           </a:p>
         </p:txBody>
       </p:sp>
@@ -3623,9 +3628,9 @@
             <a:r>
               <a:rPr lang="en-US" sz="7200" dirty="0" smtClean="0">
                 <a:solidFill>
-                  <a:schemeClr val="bg1"/>
-                </a:solidFill>
-                <a:latin typeface="+mj-lt"/>
+                  <a:srgbClr val="E87D3E"/>
+                </a:solidFill>
+                <a:latin typeface="Berlin Sans FB" panose="020E0602020502020306" pitchFamily="34" charset="0"/>
                 <a:cs typeface="Helvetica" panose="020B0604020202020204" pitchFamily="34" charset="0"/>
               </a:rPr>
               <a:t>Robot Music: Beat Generation with Factor Graphs</a:t>
@@ -3636,9 +3641,9 @@
             <a:r>
               <a:rPr lang="en-US" sz="4000" dirty="0" smtClean="0">
                 <a:solidFill>
-                  <a:schemeClr val="bg1"/>
-                </a:solidFill>
-                <a:latin typeface="+mj-lt"/>
+                  <a:srgbClr val="E87D3E"/>
+                </a:solidFill>
+                <a:latin typeface="Berlin Sans FB" panose="020E0602020502020306" pitchFamily="34" charset="0"/>
                 <a:cs typeface="Helvetica" panose="020B0604020202020204" pitchFamily="34" charset="0"/>
               </a:rPr>
               <a:t>Han Lin Aung, Justin Xu, </a:t>
@@ -3646,9 +3651,9 @@
             <a:r>
               <a:rPr lang="en-US" sz="4000" dirty="0" err="1" smtClean="0">
                 <a:solidFill>
-                  <a:schemeClr val="bg1"/>
-                </a:solidFill>
-                <a:latin typeface="+mj-lt"/>
+                  <a:srgbClr val="E87D3E"/>
+                </a:solidFill>
+                <a:latin typeface="Berlin Sans FB" panose="020E0602020502020306" pitchFamily="34" charset="0"/>
                 <a:cs typeface="Helvetica" panose="020B0604020202020204" pitchFamily="34" charset="0"/>
               </a:rPr>
               <a:t>Sicheng</a:t>
@@ -3656,9 +3661,9 @@
             <a:r>
               <a:rPr lang="en-US" sz="4000" dirty="0" smtClean="0">
                 <a:solidFill>
-                  <a:schemeClr val="bg1"/>
-                </a:solidFill>
-                <a:latin typeface="+mj-lt"/>
+                  <a:srgbClr val="E87D3E"/>
+                </a:solidFill>
+                <a:latin typeface="Berlin Sans FB" panose="020E0602020502020306" pitchFamily="34" charset="0"/>
                 <a:cs typeface="Helvetica" panose="020B0604020202020204" pitchFamily="34" charset="0"/>
               </a:rPr>
               <a:t> Zeng</a:t>
@@ -3684,6 +3689,14 @@
           <a:prstGeom prst="rect">
             <a:avLst/>
           </a:prstGeom>
+          <a:solidFill>
+            <a:srgbClr val="797979"/>
+          </a:solidFill>
+          <a:ln w="76200">
+            <a:solidFill>
+              <a:srgbClr val="6C99BB"/>
+            </a:solidFill>
+          </a:ln>
         </p:spPr>
         <p:style>
           <a:lnRef idx="2">
@@ -3708,6 +3721,9 @@
             <a:pPr algn="just"/>
             <a:r>
               <a:rPr lang="en-US" sz="2900" dirty="0" smtClean="0">
+                <a:solidFill>
+                  <a:srgbClr val="D6D6D6"/>
+                </a:solidFill>
                 <a:latin typeface="Gill Sans MT" panose="020B0502020104020203" pitchFamily="34" charset="0"/>
                 <a:ea typeface="Verdana" panose="020B0604030504040204" pitchFamily="34" charset="0"/>
                 <a:cs typeface="Verdana" panose="020B0604030504040204" pitchFamily="34" charset="0"/>
@@ -3719,6 +3735,9 @@
             <a:pPr algn="just"/>
             <a:r>
               <a:rPr lang="en-US" sz="2900" dirty="0" smtClean="0">
+                <a:solidFill>
+                  <a:srgbClr val="D6D6D6"/>
+                </a:solidFill>
                 <a:latin typeface="Gill Sans MT" panose="020B0502020104020203" pitchFamily="34" charset="0"/>
                 <a:ea typeface="Verdana" panose="020B0604030504040204" pitchFamily="34" charset="0"/>
                 <a:cs typeface="Verdana" panose="020B0604030504040204" pitchFamily="34" charset="0"/>
@@ -3730,6 +3749,9 @@
             <a:pPr algn="just"/>
             <a:r>
               <a:rPr lang="en-US" sz="2900" dirty="0" smtClean="0">
+                <a:solidFill>
+                  <a:srgbClr val="D6D6D6"/>
+                </a:solidFill>
                 <a:latin typeface="Gill Sans MT" panose="020B0502020104020203" pitchFamily="34" charset="0"/>
                 <a:ea typeface="Verdana" panose="020B0604030504040204" pitchFamily="34" charset="0"/>
                 <a:cs typeface="Verdana" panose="020B0604030504040204" pitchFamily="34" charset="0"/>
@@ -3738,6 +3760,9 @@
             </a:r>
             <a:r>
               <a:rPr lang="en-US" sz="2900" dirty="0" err="1" smtClean="0">
+                <a:solidFill>
+                  <a:srgbClr val="D6D6D6"/>
+                </a:solidFill>
                 <a:latin typeface="Gill Sans MT" panose="020B0502020104020203" pitchFamily="34" charset="0"/>
                 <a:ea typeface="Verdana" panose="020B0604030504040204" pitchFamily="34" charset="0"/>
                 <a:cs typeface="Verdana" panose="020B0604030504040204" pitchFamily="34" charset="0"/>
@@ -3745,6 +3770,9 @@
               <a:t>background</a:t>
             </a:r>
             <a:endParaRPr lang="en-US" sz="2900" dirty="0" smtClean="0">
+              <a:solidFill>
+                <a:srgbClr val="D6D6D6"/>
+              </a:solidFill>
               <a:latin typeface="Gill Sans MT" panose="020B0502020104020203" pitchFamily="34" charset="0"/>
               <a:ea typeface="Verdana" panose="020B0604030504040204" pitchFamily="34" charset="0"/>
               <a:cs typeface="Verdana" panose="020B0604030504040204" pitchFamily="34" charset="0"/>
@@ -3767,8 +3795,13 @@
             <a:avLst/>
           </a:prstGeom>
           <a:solidFill>
-            <a:srgbClr val="8C1515"/>
+            <a:srgbClr val="1B001E"/>
           </a:solidFill>
+          <a:ln w="76200">
+            <a:solidFill>
+              <a:srgbClr val="9E86C8"/>
+            </a:solidFill>
+          </a:ln>
         </p:spPr>
         <p:style>
           <a:lnRef idx="2">
@@ -3792,20 +3825,14 @@
           <a:p>
             <a:pPr algn="ctr"/>
             <a:r>
-              <a:rPr lang="en-US" sz="4800" smtClean="0">
-                <a:solidFill>
-                  <a:schemeClr val="bg1"/>
-                </a:solidFill>
-                <a:latin typeface="+mj-lt"/>
+              <a:rPr lang="en-US" sz="4800" dirty="0" smtClean="0">
+                <a:solidFill>
+                  <a:srgbClr val="B4D273"/>
+                </a:solidFill>
+                <a:latin typeface="Berlin Sans FB" panose="020E0602020502020306" pitchFamily="34" charset="0"/>
               </a:rPr>
               <a:t>Background</a:t>
             </a:r>
-            <a:endParaRPr lang="en-US" sz="4800" dirty="0" smtClean="0">
-              <a:solidFill>
-                <a:schemeClr val="bg1"/>
-              </a:solidFill>
-              <a:latin typeface="+mj-lt"/>
-            </a:endParaRPr>
           </a:p>
         </p:txBody>
       </p:sp>
@@ -3820,6 +3847,15 @@
         <p:blipFill>
           <a:blip r:embed="rId3" cstate="print">
             <a:extLst>
+              <a:ext uri="{BEBA8EAE-BF5A-486C-A8C5-ECC9F3942E4B}">
+                <a14:imgProps xmlns:a14="http://schemas.microsoft.com/office/drawing/2010/main">
+                  <a14:imgLayer r:embed="rId4">
+                    <a14:imgEffect>
+                      <a14:artisticGlowEdges/>
+                    </a14:imgEffect>
+                  </a14:imgLayer>
+                </a14:imgProps>
+              </a:ext>
               <a:ext uri="{28A0092B-C50C-407E-A947-70E740481C1C}">
                 <a14:useLocalDpi xmlns:a14="http://schemas.microsoft.com/office/drawing/2010/main" val="0"/>
               </a:ext>
@@ -3855,6 +3891,14 @@
           <a:prstGeom prst="rect">
             <a:avLst/>
           </a:prstGeom>
+          <a:solidFill>
+            <a:srgbClr val="797979"/>
+          </a:solidFill>
+          <a:ln w="76200">
+            <a:solidFill>
+              <a:srgbClr val="6C99BB"/>
+            </a:solidFill>
+          </a:ln>
         </p:spPr>
         <p:style>
           <a:lnRef idx="2">
@@ -4014,7 +4058,10 @@
           <a:p>
             <a:pPr algn="just"/>
             <a:r>
-              <a:rPr lang="en-US" sz="2900" smtClean="0">
+              <a:rPr lang="en-US" sz="2900" dirty="0" smtClean="0">
+                <a:solidFill>
+                  <a:srgbClr val="D6D6D6"/>
+                </a:solidFill>
                 <a:latin typeface="Gill Sans MT" panose="020B0502020104020203" pitchFamily="34" charset="0"/>
                 <a:ea typeface="Verdana" panose="020B0604030504040204" pitchFamily="34" charset="0"/>
                 <a:cs typeface="Verdana" panose="020B0604030504040204" pitchFamily="34" charset="0"/>
@@ -4025,7 +4072,10 @@
           <a:p>
             <a:pPr algn="just"/>
             <a:r>
-              <a:rPr lang="en-US" sz="2900" smtClean="0">
+              <a:rPr lang="en-US" sz="2900" dirty="0" smtClean="0">
+                <a:solidFill>
+                  <a:srgbClr val="D6D6D6"/>
+                </a:solidFill>
                 <a:latin typeface="Gill Sans MT" panose="020B0502020104020203" pitchFamily="34" charset="0"/>
                 <a:ea typeface="Verdana" panose="020B0604030504040204" pitchFamily="34" charset="0"/>
                 <a:cs typeface="Verdana" panose="020B0604030504040204" pitchFamily="34" charset="0"/>
@@ -4036,14 +4086,31 @@
           <a:p>
             <a:pPr algn="just"/>
             <a:r>
-              <a:rPr lang="en-US" sz="2900" smtClean="0">
+              <a:rPr lang="en-US" sz="2900" dirty="0" smtClean="0">
+                <a:solidFill>
+                  <a:srgbClr val="D6D6D6"/>
+                </a:solidFill>
                 <a:latin typeface="Gill Sans MT" panose="020B0502020104020203" pitchFamily="34" charset="0"/>
                 <a:ea typeface="Verdana" panose="020B0604030504040204" pitchFamily="34" charset="0"/>
                 <a:cs typeface="Verdana" panose="020B0604030504040204" pitchFamily="34" charset="0"/>
               </a:rPr>
-              <a:t>BACKGROUND background</a:t>
+              <a:t>BACKGROUND </a:t>
+            </a:r>
+            <a:r>
+              <a:rPr lang="en-US" sz="2900" dirty="0" err="1" smtClean="0">
+                <a:solidFill>
+                  <a:srgbClr val="D6D6D6"/>
+                </a:solidFill>
+                <a:latin typeface="Gill Sans MT" panose="020B0502020104020203" pitchFamily="34" charset="0"/>
+                <a:ea typeface="Verdana" panose="020B0604030504040204" pitchFamily="34" charset="0"/>
+                <a:cs typeface="Verdana" panose="020B0604030504040204" pitchFamily="34" charset="0"/>
+              </a:rPr>
+              <a:t>background</a:t>
             </a:r>
             <a:endParaRPr lang="en-US" sz="2900" dirty="0" smtClean="0">
+              <a:solidFill>
+                <a:srgbClr val="D6D6D6"/>
+              </a:solidFill>
               <a:latin typeface="Gill Sans MT" panose="020B0502020104020203" pitchFamily="34" charset="0"/>
               <a:ea typeface="Verdana" panose="020B0604030504040204" pitchFamily="34" charset="0"/>
               <a:cs typeface="Verdana" panose="020B0604030504040204" pitchFamily="34" charset="0"/>
@@ -4066,8 +4133,13 @@
             <a:avLst/>
           </a:prstGeom>
           <a:solidFill>
-            <a:srgbClr val="8C1515"/>
+            <a:srgbClr val="1B001E"/>
           </a:solidFill>
+          <a:ln w="76200">
+            <a:solidFill>
+              <a:srgbClr val="9E86C8"/>
+            </a:solidFill>
+          </a:ln>
         </p:spPr>
         <p:style>
           <a:lnRef idx="2">
@@ -4093,18 +4165,12 @@
             <a:r>
               <a:rPr lang="en-US" sz="4800" dirty="0" smtClean="0">
                 <a:solidFill>
-                  <a:schemeClr val="bg1"/>
-                </a:solidFill>
-                <a:latin typeface="+mj-lt"/>
+                  <a:srgbClr val="B4D273"/>
+                </a:solidFill>
+                <a:latin typeface="Berlin Sans FB" panose="020E0602020502020306" pitchFamily="34" charset="0"/>
               </a:rPr>
               <a:t>Method 1</a:t>
             </a:r>
-            <a:endParaRPr lang="en-US" sz="4800" dirty="0" smtClean="0">
-              <a:solidFill>
-                <a:schemeClr val="bg1"/>
-              </a:solidFill>
-              <a:latin typeface="+mj-lt"/>
-            </a:endParaRPr>
           </a:p>
         </p:txBody>
       </p:sp>
@@ -4119,11 +4185,19 @@
         <p:spPr>
           <a:xfrm>
             <a:off x="14173200" y="9644729"/>
-            <a:ext cx="12344399" cy="2965203"/>
+            <a:ext cx="12344399" cy="1358609"/>
           </a:xfrm>
           <a:prstGeom prst="rect">
             <a:avLst/>
           </a:prstGeom>
+          <a:solidFill>
+            <a:srgbClr val="797979"/>
+          </a:solidFill>
+          <a:ln w="76200">
+            <a:solidFill>
+              <a:srgbClr val="6C99BB"/>
+            </a:solidFill>
+          </a:ln>
         </p:spPr>
         <p:style>
           <a:lnRef idx="2">
@@ -4284,6 +4358,9 @@
             <a:pPr algn="just"/>
             <a:r>
               <a:rPr lang="en-US" sz="2900" dirty="0" smtClean="0">
+                <a:solidFill>
+                  <a:srgbClr val="D6D6D6"/>
+                </a:solidFill>
                 <a:latin typeface="Gill Sans MT" panose="020B0502020104020203" pitchFamily="34" charset="0"/>
                 <a:ea typeface="Verdana" panose="020B0604030504040204" pitchFamily="34" charset="0"/>
                 <a:cs typeface="Verdana" panose="020B0604030504040204" pitchFamily="34" charset="0"/>
@@ -4295,45 +4372,23 @@
             <a:pPr algn="just"/>
             <a:r>
               <a:rPr lang="en-US" sz="2900" dirty="0" smtClean="0">
+                <a:solidFill>
+                  <a:srgbClr val="D6D6D6"/>
+                </a:solidFill>
                 <a:latin typeface="Gill Sans MT" panose="020B0502020104020203" pitchFamily="34" charset="0"/>
                 <a:ea typeface="Verdana" panose="020B0604030504040204" pitchFamily="34" charset="0"/>
                 <a:cs typeface="Verdana" panose="020B0604030504040204" pitchFamily="34" charset="0"/>
               </a:rPr>
               <a:t>Results</a:t>
             </a:r>
-          </a:p>
-          <a:p>
-            <a:pPr algn="just"/>
-            <a:r>
-              <a:rPr lang="en-US" sz="2900" dirty="0" smtClean="0">
-                <a:latin typeface="Gill Sans MT" panose="020B0502020104020203" pitchFamily="34" charset="0"/>
-                <a:ea typeface="Verdana" panose="020B0604030504040204" pitchFamily="34" charset="0"/>
-                <a:cs typeface="Verdana" panose="020B0604030504040204" pitchFamily="34" charset="0"/>
-              </a:rPr>
-              <a:t>Results</a:t>
-            </a:r>
-          </a:p>
-          <a:p>
-            <a:pPr algn="just"/>
-            <a:r>
-              <a:rPr lang="en-US" sz="2900" dirty="0" smtClean="0">
-                <a:latin typeface="Gill Sans MT" panose="020B0502020104020203" pitchFamily="34" charset="0"/>
-                <a:ea typeface="Verdana" panose="020B0604030504040204" pitchFamily="34" charset="0"/>
-                <a:cs typeface="Verdana" panose="020B0604030504040204" pitchFamily="34" charset="0"/>
-              </a:rPr>
-              <a:t>Results</a:t>
-            </a:r>
-          </a:p>
-          <a:p>
-            <a:pPr algn="just"/>
-            <a:r>
-              <a:rPr lang="en-US" sz="2900" dirty="0" smtClean="0">
-                <a:latin typeface="Gill Sans MT" panose="020B0502020104020203" pitchFamily="34" charset="0"/>
-                <a:ea typeface="Verdana" panose="020B0604030504040204" pitchFamily="34" charset="0"/>
-                <a:cs typeface="Verdana" panose="020B0604030504040204" pitchFamily="34" charset="0"/>
-              </a:rPr>
-              <a:t>Results</a:t>
-            </a:r>
+            <a:endParaRPr lang="en-US" sz="2900" dirty="0" smtClean="0">
+              <a:solidFill>
+                <a:srgbClr val="D6D6D6"/>
+              </a:solidFill>
+              <a:latin typeface="Gill Sans MT" panose="020B0502020104020203" pitchFamily="34" charset="0"/>
+              <a:ea typeface="Verdana" panose="020B0604030504040204" pitchFamily="34" charset="0"/>
+              <a:cs typeface="Verdana" panose="020B0604030504040204" pitchFamily="34" charset="0"/>
+            </a:endParaRPr>
           </a:p>
         </p:txBody>
       </p:sp>
@@ -4352,8 +4407,13 @@
             <a:avLst/>
           </a:prstGeom>
           <a:solidFill>
-            <a:srgbClr val="8C1515"/>
+            <a:srgbClr val="1B001E"/>
           </a:solidFill>
+          <a:ln w="76200">
+            <a:solidFill>
+              <a:srgbClr val="9E86C8"/>
+            </a:solidFill>
+          </a:ln>
         </p:spPr>
         <p:style>
           <a:lnRef idx="2">
@@ -4379,18 +4439,12 @@
             <a:r>
               <a:rPr lang="en-US" sz="4800" dirty="0" smtClean="0">
                 <a:solidFill>
-                  <a:schemeClr val="bg1"/>
-                </a:solidFill>
-                <a:latin typeface="+mj-lt"/>
+                  <a:srgbClr val="B4D273"/>
+                </a:solidFill>
+                <a:latin typeface="Berlin Sans FB" panose="020E0602020502020306" pitchFamily="34" charset="0"/>
               </a:rPr>
               <a:t>Results</a:t>
             </a:r>
-            <a:endParaRPr lang="en-US" sz="4800" dirty="0" smtClean="0">
-              <a:solidFill>
-                <a:schemeClr val="bg1"/>
-              </a:solidFill>
-              <a:latin typeface="+mj-lt"/>
-            </a:endParaRPr>
           </a:p>
         </p:txBody>
       </p:sp>
@@ -4410,6 +4464,14 @@
           <a:prstGeom prst="rect">
             <a:avLst/>
           </a:prstGeom>
+          <a:solidFill>
+            <a:srgbClr val="797979"/>
+          </a:solidFill>
+          <a:ln w="76200">
+            <a:solidFill>
+              <a:srgbClr val="6C99BB"/>
+            </a:solidFill>
+          </a:ln>
         </p:spPr>
         <p:style>
           <a:lnRef idx="2">
@@ -4570,6 +4632,9 @@
             <a:pPr algn="just"/>
             <a:r>
               <a:rPr lang="en-US" sz="2900" dirty="0" smtClean="0">
+                <a:solidFill>
+                  <a:srgbClr val="D6D6D6"/>
+                </a:solidFill>
                 <a:latin typeface="Gill Sans MT" panose="020B0502020104020203" pitchFamily="34" charset="0"/>
                 <a:ea typeface="Verdana" panose="020B0604030504040204" pitchFamily="34" charset="0"/>
                 <a:cs typeface="Verdana" panose="020B0604030504040204" pitchFamily="34" charset="0"/>
@@ -4581,6 +4646,9 @@
             <a:pPr algn="just"/>
             <a:r>
               <a:rPr lang="en-US" sz="2900" dirty="0" smtClean="0">
+                <a:solidFill>
+                  <a:srgbClr val="D6D6D6"/>
+                </a:solidFill>
                 <a:latin typeface="Gill Sans MT" panose="020B0502020104020203" pitchFamily="34" charset="0"/>
                 <a:ea typeface="Verdana" panose="020B0604030504040204" pitchFamily="34" charset="0"/>
                 <a:cs typeface="Verdana" panose="020B0604030504040204" pitchFamily="34" charset="0"/>
@@ -4592,6 +4660,9 @@
             <a:pPr algn="just"/>
             <a:r>
               <a:rPr lang="en-US" sz="2900" dirty="0" smtClean="0">
+                <a:solidFill>
+                  <a:srgbClr val="D6D6D6"/>
+                </a:solidFill>
                 <a:latin typeface="Gill Sans MT" panose="020B0502020104020203" pitchFamily="34" charset="0"/>
                 <a:ea typeface="Verdana" panose="020B0604030504040204" pitchFamily="34" charset="0"/>
                 <a:cs typeface="Verdana" panose="020B0604030504040204" pitchFamily="34" charset="0"/>
@@ -4603,6 +4674,9 @@
             <a:pPr algn="just"/>
             <a:r>
               <a:rPr lang="en-US" sz="2900" dirty="0" smtClean="0">
+                <a:solidFill>
+                  <a:srgbClr val="D6D6D6"/>
+                </a:solidFill>
                 <a:latin typeface="Gill Sans MT" panose="020B0502020104020203" pitchFamily="34" charset="0"/>
                 <a:ea typeface="Verdana" panose="020B0604030504040204" pitchFamily="34" charset="0"/>
                 <a:cs typeface="Verdana" panose="020B0604030504040204" pitchFamily="34" charset="0"/>
@@ -4614,6 +4688,9 @@
             <a:pPr algn="just"/>
             <a:r>
               <a:rPr lang="en-US" sz="2900" dirty="0" smtClean="0">
+                <a:solidFill>
+                  <a:srgbClr val="D6D6D6"/>
+                </a:solidFill>
                 <a:latin typeface="Gill Sans MT" panose="020B0502020104020203" pitchFamily="34" charset="0"/>
                 <a:ea typeface="Verdana" panose="020B0604030504040204" pitchFamily="34" charset="0"/>
                 <a:cs typeface="Verdana" panose="020B0604030504040204" pitchFamily="34" charset="0"/>
@@ -4625,6 +4702,9 @@
             <a:pPr algn="just"/>
             <a:r>
               <a:rPr lang="en-US" sz="2900" dirty="0" smtClean="0">
+                <a:solidFill>
+                  <a:srgbClr val="D6D6D6"/>
+                </a:solidFill>
                 <a:latin typeface="Gill Sans MT" panose="020B0502020104020203" pitchFamily="34" charset="0"/>
                 <a:ea typeface="Verdana" panose="020B0604030504040204" pitchFamily="34" charset="0"/>
                 <a:cs typeface="Verdana" panose="020B0604030504040204" pitchFamily="34" charset="0"/>
@@ -4636,17 +4716,15 @@
             <a:pPr algn="just"/>
             <a:r>
               <a:rPr lang="en-US" sz="2900" dirty="0" smtClean="0">
+                <a:solidFill>
+                  <a:srgbClr val="D6D6D6"/>
+                </a:solidFill>
                 <a:latin typeface="Gill Sans MT" panose="020B0502020104020203" pitchFamily="34" charset="0"/>
                 <a:ea typeface="Verdana" panose="020B0604030504040204" pitchFamily="34" charset="0"/>
                 <a:cs typeface="Verdana" panose="020B0604030504040204" pitchFamily="34" charset="0"/>
               </a:rPr>
               <a:t>methods</a:t>
             </a:r>
-            <a:endParaRPr lang="en-US" sz="2900" dirty="0" smtClean="0">
-              <a:latin typeface="Gill Sans MT" panose="020B0502020104020203" pitchFamily="34" charset="0"/>
-              <a:ea typeface="Verdana" panose="020B0604030504040204" pitchFamily="34" charset="0"/>
-              <a:cs typeface="Verdana" panose="020B0604030504040204" pitchFamily="34" charset="0"/>
-            </a:endParaRPr>
           </a:p>
         </p:txBody>
       </p:sp>
@@ -4665,8 +4743,13 @@
             <a:avLst/>
           </a:prstGeom>
           <a:solidFill>
-            <a:srgbClr val="8C1515"/>
+            <a:srgbClr val="1B001E"/>
           </a:solidFill>
+          <a:ln w="76200">
+            <a:solidFill>
+              <a:srgbClr val="9E86C8"/>
+            </a:solidFill>
+          </a:ln>
         </p:spPr>
         <p:style>
           <a:lnRef idx="2">
@@ -4692,51 +4775,15 @@
             <a:r>
               <a:rPr lang="en-US" sz="4800" dirty="0" smtClean="0">
                 <a:solidFill>
-                  <a:schemeClr val="bg1"/>
-                </a:solidFill>
-                <a:latin typeface="+mj-lt"/>
+                  <a:srgbClr val="B4D273"/>
+                </a:solidFill>
+                <a:latin typeface="Berlin Sans FB" panose="020E0602020502020306" pitchFamily="34" charset="0"/>
               </a:rPr>
               <a:t>Method 3</a:t>
             </a:r>
-            <a:endParaRPr lang="en-US" sz="4800" dirty="0" smtClean="0">
-              <a:solidFill>
-                <a:schemeClr val="bg1"/>
-              </a:solidFill>
-              <a:latin typeface="+mj-lt"/>
-            </a:endParaRPr>
-          </a:p>
-        </p:txBody>
-      </p:sp>
-      <p:pic>
-        <p:nvPicPr>
-          <p:cNvPr id="3" name="Picture 2"/>
-          <p:cNvPicPr>
-            <a:picLocks noChangeAspect="1"/>
-          </p:cNvPicPr>
-          <p:nvPr/>
-        </p:nvPicPr>
-        <p:blipFill>
-          <a:blip r:embed="rId4">
-            <a:extLst>
-              <a:ext uri="{28A0092B-C50C-407E-A947-70E740481C1C}">
-                <a14:useLocalDpi xmlns:a14="http://schemas.microsoft.com/office/drawing/2010/main" val="0"/>
-              </a:ext>
-            </a:extLst>
-          </a:blip>
-          <a:stretch>
-            <a:fillRect/>
-          </a:stretch>
-        </p:blipFill>
-        <p:spPr>
-          <a:xfrm>
-            <a:off x="4151102" y="9677400"/>
-            <a:ext cx="5797176" cy="3555601"/>
-          </a:xfrm>
-          <a:prstGeom prst="rect">
-            <a:avLst/>
-          </a:prstGeom>
-        </p:spPr>
-      </p:pic>
+          </a:p>
+        </p:txBody>
+      </p:sp>
       <p:sp>
         <p:nvSpPr>
           <p:cNvPr id="33" name="Text Placeholder 33"/>
@@ -4747,12 +4794,20 @@
         </p:nvSpPr>
         <p:spPr>
           <a:xfrm>
-            <a:off x="916780" y="14565059"/>
+            <a:off x="916780" y="16012859"/>
             <a:ext cx="12265821" cy="1894141"/>
           </a:xfrm>
           <a:prstGeom prst="rect">
             <a:avLst/>
           </a:prstGeom>
+          <a:solidFill>
+            <a:srgbClr val="797979"/>
+          </a:solidFill>
+          <a:ln w="76200">
+            <a:solidFill>
+              <a:srgbClr val="6C99BB"/>
+            </a:solidFill>
+          </a:ln>
         </p:spPr>
         <p:style>
           <a:lnRef idx="2">
@@ -4912,7 +4967,10 @@
           <a:p>
             <a:pPr algn="just"/>
             <a:r>
-              <a:rPr lang="en-US" sz="2900" smtClean="0">
+              <a:rPr lang="en-US" sz="2900" dirty="0" smtClean="0">
+                <a:solidFill>
+                  <a:srgbClr val="D6D6D6"/>
+                </a:solidFill>
                 <a:latin typeface="Gill Sans MT" panose="020B0502020104020203" pitchFamily="34" charset="0"/>
                 <a:ea typeface="Verdana" panose="020B0604030504040204" pitchFamily="34" charset="0"/>
                 <a:cs typeface="Verdana" panose="020B0604030504040204" pitchFamily="34" charset="0"/>
@@ -4923,7 +4981,10 @@
           <a:p>
             <a:pPr algn="just"/>
             <a:r>
-              <a:rPr lang="en-US" sz="2900" smtClean="0">
+              <a:rPr lang="en-US" sz="2900" dirty="0" smtClean="0">
+                <a:solidFill>
+                  <a:srgbClr val="D6D6D6"/>
+                </a:solidFill>
                 <a:latin typeface="Gill Sans MT" panose="020B0502020104020203" pitchFamily="34" charset="0"/>
                 <a:ea typeface="Verdana" panose="020B0604030504040204" pitchFamily="34" charset="0"/>
                 <a:cs typeface="Verdana" panose="020B0604030504040204" pitchFamily="34" charset="0"/>
@@ -4934,14 +4995,31 @@
           <a:p>
             <a:pPr algn="just"/>
             <a:r>
-              <a:rPr lang="en-US" sz="2900" smtClean="0">
+              <a:rPr lang="en-US" sz="2900" dirty="0" smtClean="0">
+                <a:solidFill>
+                  <a:srgbClr val="D6D6D6"/>
+                </a:solidFill>
                 <a:latin typeface="Gill Sans MT" panose="020B0502020104020203" pitchFamily="34" charset="0"/>
                 <a:ea typeface="Verdana" panose="020B0604030504040204" pitchFamily="34" charset="0"/>
                 <a:cs typeface="Verdana" panose="020B0604030504040204" pitchFamily="34" charset="0"/>
               </a:rPr>
-              <a:t>BACKGROUND background</a:t>
+              <a:t>BACKGROUND </a:t>
+            </a:r>
+            <a:r>
+              <a:rPr lang="en-US" sz="2900" dirty="0" err="1" smtClean="0">
+                <a:solidFill>
+                  <a:srgbClr val="D6D6D6"/>
+                </a:solidFill>
+                <a:latin typeface="Gill Sans MT" panose="020B0502020104020203" pitchFamily="34" charset="0"/>
+                <a:ea typeface="Verdana" panose="020B0604030504040204" pitchFamily="34" charset="0"/>
+                <a:cs typeface="Verdana" panose="020B0604030504040204" pitchFamily="34" charset="0"/>
+              </a:rPr>
+              <a:t>background</a:t>
             </a:r>
             <a:endParaRPr lang="en-US" sz="2900" dirty="0" smtClean="0">
+              <a:solidFill>
+                <a:srgbClr val="D6D6D6"/>
+              </a:solidFill>
               <a:latin typeface="Gill Sans MT" panose="020B0502020104020203" pitchFamily="34" charset="0"/>
               <a:ea typeface="Verdana" panose="020B0604030504040204" pitchFamily="34" charset="0"/>
               <a:cs typeface="Verdana" panose="020B0604030504040204" pitchFamily="34" charset="0"/>
@@ -4957,15 +5035,20 @@
         </p:nvSpPr>
         <p:spPr>
           <a:xfrm>
-            <a:off x="916780" y="13422059"/>
+            <a:off x="916780" y="14869859"/>
             <a:ext cx="12265822" cy="848577"/>
           </a:xfrm>
           <a:prstGeom prst="rect">
             <a:avLst/>
           </a:prstGeom>
           <a:solidFill>
-            <a:srgbClr val="8C1515"/>
+            <a:srgbClr val="1B001E"/>
           </a:solidFill>
+          <a:ln w="76200">
+            <a:solidFill>
+              <a:srgbClr val="9E86C8"/>
+            </a:solidFill>
+          </a:ln>
         </p:spPr>
         <p:style>
           <a:lnRef idx="2">
@@ -4991,18 +5074,12 @@
             <a:r>
               <a:rPr lang="en-US" sz="4800" dirty="0" smtClean="0">
                 <a:solidFill>
-                  <a:schemeClr val="bg1"/>
-                </a:solidFill>
-                <a:latin typeface="+mj-lt"/>
+                  <a:srgbClr val="B4D273"/>
+                </a:solidFill>
+                <a:latin typeface="Berlin Sans FB" panose="020E0602020502020306" pitchFamily="34" charset="0"/>
               </a:rPr>
               <a:t>Method 2</a:t>
             </a:r>
-            <a:endParaRPr lang="en-US" sz="4800" dirty="0" smtClean="0">
-              <a:solidFill>
-                <a:schemeClr val="bg1"/>
-              </a:solidFill>
-              <a:latin typeface="+mj-lt"/>
-            </a:endParaRPr>
           </a:p>
         </p:txBody>
       </p:sp>
@@ -5016,12 +5093,20 @@
         </p:nvSpPr>
         <p:spPr>
           <a:xfrm>
-            <a:off x="14173200" y="14173200"/>
+            <a:off x="14173200" y="15477328"/>
             <a:ext cx="12344399" cy="2429672"/>
           </a:xfrm>
           <a:prstGeom prst="rect">
             <a:avLst/>
           </a:prstGeom>
+          <a:solidFill>
+            <a:srgbClr val="797979"/>
+          </a:solidFill>
+          <a:ln w="76200">
+            <a:solidFill>
+              <a:srgbClr val="6C99BB"/>
+            </a:solidFill>
+          </a:ln>
         </p:spPr>
         <p:style>
           <a:lnRef idx="2">
@@ -5182,6 +5267,9 @@
             <a:pPr algn="just"/>
             <a:r>
               <a:rPr lang="en-US" sz="2900" dirty="0" smtClean="0">
+                <a:solidFill>
+                  <a:srgbClr val="D6D6D6"/>
+                </a:solidFill>
                 <a:latin typeface="Gill Sans MT" panose="020B0502020104020203" pitchFamily="34" charset="0"/>
                 <a:ea typeface="Verdana" panose="020B0604030504040204" pitchFamily="34" charset="0"/>
                 <a:cs typeface="Verdana" panose="020B0604030504040204" pitchFamily="34" charset="0"/>
@@ -5193,6 +5281,9 @@
             <a:pPr algn="just"/>
             <a:r>
               <a:rPr lang="en-US" sz="2900" dirty="0" smtClean="0">
+                <a:solidFill>
+                  <a:srgbClr val="D6D6D6"/>
+                </a:solidFill>
                 <a:latin typeface="Gill Sans MT" panose="020B0502020104020203" pitchFamily="34" charset="0"/>
                 <a:ea typeface="Verdana" panose="020B0604030504040204" pitchFamily="34" charset="0"/>
                 <a:cs typeface="Verdana" panose="020B0604030504040204" pitchFamily="34" charset="0"/>
@@ -5204,6 +5295,9 @@
             <a:pPr algn="just"/>
             <a:r>
               <a:rPr lang="en-US" sz="2900" dirty="0" smtClean="0">
+                <a:solidFill>
+                  <a:srgbClr val="D6D6D6"/>
+                </a:solidFill>
                 <a:latin typeface="Gill Sans MT" panose="020B0502020104020203" pitchFamily="34" charset="0"/>
                 <a:ea typeface="Verdana" panose="020B0604030504040204" pitchFamily="34" charset="0"/>
                 <a:cs typeface="Verdana" panose="020B0604030504040204" pitchFamily="34" charset="0"/>
@@ -5215,6 +5309,9 @@
             <a:pPr algn="just"/>
             <a:r>
               <a:rPr lang="en-US" sz="2900" dirty="0" smtClean="0">
+                <a:solidFill>
+                  <a:srgbClr val="D6D6D6"/>
+                </a:solidFill>
                 <a:latin typeface="Gill Sans MT" panose="020B0502020104020203" pitchFamily="34" charset="0"/>
                 <a:ea typeface="Verdana" panose="020B0604030504040204" pitchFamily="34" charset="0"/>
                 <a:cs typeface="Verdana" panose="020B0604030504040204" pitchFamily="34" charset="0"/>
@@ -5232,15 +5329,20 @@
         </p:nvSpPr>
         <p:spPr>
           <a:xfrm>
-            <a:off x="14173200" y="13030200"/>
+            <a:off x="14173200" y="14334328"/>
             <a:ext cx="12344400" cy="848577"/>
           </a:xfrm>
           <a:prstGeom prst="rect">
             <a:avLst/>
           </a:prstGeom>
           <a:solidFill>
-            <a:srgbClr val="8C1515"/>
+            <a:srgbClr val="1B001E"/>
           </a:solidFill>
+          <a:ln w="76200">
+            <a:solidFill>
+              <a:srgbClr val="9E86C8"/>
+            </a:solidFill>
+          </a:ln>
         </p:spPr>
         <p:style>
           <a:lnRef idx="2">
@@ -5266,21 +5368,80 @@
             <a:r>
               <a:rPr lang="en-US" sz="4800" dirty="0" smtClean="0">
                 <a:solidFill>
-                  <a:schemeClr val="bg1"/>
-                </a:solidFill>
-                <a:latin typeface="+mj-lt"/>
+                  <a:srgbClr val="B4D273"/>
+                </a:solidFill>
+                <a:latin typeface="Berlin Sans FB" panose="020E0602020502020306" pitchFamily="34" charset="0"/>
               </a:rPr>
               <a:t>Conclusion</a:t>
             </a:r>
-            <a:endParaRPr lang="en-US" sz="4800" dirty="0" smtClean="0">
-              <a:solidFill>
-                <a:schemeClr val="bg1"/>
-              </a:solidFill>
-              <a:latin typeface="+mj-lt"/>
-            </a:endParaRPr>
-          </a:p>
-        </p:txBody>
-      </p:sp>
+          </a:p>
+        </p:txBody>
+      </p:sp>
+      <p:pic>
+        <p:nvPicPr>
+          <p:cNvPr id="4" name="Picture 3"/>
+          <p:cNvPicPr>
+            <a:picLocks noChangeAspect="1"/>
+          </p:cNvPicPr>
+          <p:nvPr/>
+        </p:nvPicPr>
+        <p:blipFill>
+          <a:blip r:embed="rId5">
+            <a:extLst>
+              <a:ext uri="{28A0092B-C50C-407E-A947-70E740481C1C}">
+                <a14:useLocalDpi xmlns:a14="http://schemas.microsoft.com/office/drawing/2010/main" val="0"/>
+              </a:ext>
+            </a:extLst>
+          </a:blip>
+          <a:stretch>
+            <a:fillRect/>
+          </a:stretch>
+        </p:blipFill>
+        <p:spPr>
+          <a:xfrm>
+            <a:off x="15316200" y="11353800"/>
+            <a:ext cx="10058400" cy="2729602"/>
+          </a:xfrm>
+          <a:prstGeom prst="rect">
+            <a:avLst/>
+          </a:prstGeom>
+        </p:spPr>
+      </p:pic>
+      <p:pic>
+        <p:nvPicPr>
+          <p:cNvPr id="8" name="Picture 7"/>
+          <p:cNvPicPr>
+            <a:picLocks noChangeAspect="1"/>
+          </p:cNvPicPr>
+          <p:nvPr/>
+        </p:nvPicPr>
+        <p:blipFill>
+          <a:blip r:embed="rId6">
+            <a:extLst>
+              <a:ext uri="{28A0092B-C50C-407E-A947-70E740481C1C}">
+                <a14:useLocalDpi xmlns:a14="http://schemas.microsoft.com/office/drawing/2010/main" val="0"/>
+              </a:ext>
+            </a:extLst>
+          </a:blip>
+          <a:stretch>
+            <a:fillRect/>
+          </a:stretch>
+        </p:blipFill>
+        <p:spPr>
+          <a:xfrm>
+            <a:off x="3277790" y="9829800"/>
+            <a:ext cx="7543800" cy="4626864"/>
+          </a:xfrm>
+          <a:prstGeom prst="rect">
+            <a:avLst/>
+          </a:prstGeom>
+          <a:ln w="38100">
+            <a:solidFill>
+              <a:srgbClr val="9E86C8"/>
+            </a:solidFill>
+          </a:ln>
+        </p:spPr>
+      </p:pic>
     </p:spTree>
   </p:cSld>
   <p:clrMapOvr>

</xml_diff>

<commit_message>
working on conditional probabilities now
</commit_message>
<xml_diff>
--- a/poster_RobotMusic.pptx
+++ b/poster_RobotMusic.pptx
@@ -3628,7 +3628,7 @@
             <a:r>
               <a:rPr lang="en-US" sz="7200" dirty="0" smtClean="0">
                 <a:solidFill>
-                  <a:srgbClr val="E87D3E"/>
+                  <a:srgbClr val="66D9EF"/>
                 </a:solidFill>
                 <a:latin typeface="Berlin Sans FB" panose="020E0602020502020306" pitchFamily="34" charset="0"/>
                 <a:cs typeface="Helvetica" panose="020B0604020202020204" pitchFamily="34" charset="0"/>
@@ -3641,7 +3641,7 @@
             <a:r>
               <a:rPr lang="en-US" sz="4000" dirty="0" smtClean="0">
                 <a:solidFill>
-                  <a:srgbClr val="E87D3E"/>
+                  <a:srgbClr val="66D9EF"/>
                 </a:solidFill>
                 <a:latin typeface="Berlin Sans FB" panose="020E0602020502020306" pitchFamily="34" charset="0"/>
                 <a:cs typeface="Helvetica" panose="020B0604020202020204" pitchFamily="34" charset="0"/>
@@ -3651,7 +3651,7 @@
             <a:r>
               <a:rPr lang="en-US" sz="4000" dirty="0" err="1" smtClean="0">
                 <a:solidFill>
-                  <a:srgbClr val="E87D3E"/>
+                  <a:srgbClr val="66D9EF"/>
                 </a:solidFill>
                 <a:latin typeface="Berlin Sans FB" panose="020E0602020502020306" pitchFamily="34" charset="0"/>
                 <a:cs typeface="Helvetica" panose="020B0604020202020204" pitchFamily="34" charset="0"/>
@@ -3661,7 +3661,7 @@
             <a:r>
               <a:rPr lang="en-US" sz="4000" dirty="0" smtClean="0">
                 <a:solidFill>
-                  <a:srgbClr val="E87D3E"/>
+                  <a:srgbClr val="66D9EF"/>
                 </a:solidFill>
                 <a:latin typeface="Berlin Sans FB" panose="020E0602020502020306" pitchFamily="34" charset="0"/>
                 <a:cs typeface="Helvetica" panose="020B0604020202020204" pitchFamily="34" charset="0"/>
@@ -3827,7 +3827,7 @@
             <a:r>
               <a:rPr lang="en-US" sz="4800" dirty="0" smtClean="0">
                 <a:solidFill>
-                  <a:srgbClr val="B4D273"/>
+                  <a:srgbClr val="A6E22E"/>
                 </a:solidFill>
                 <a:latin typeface="Berlin Sans FB" panose="020E0602020502020306" pitchFamily="34" charset="0"/>
               </a:rPr>
@@ -4165,7 +4165,7 @@
             <a:r>
               <a:rPr lang="en-US" sz="4800" dirty="0" smtClean="0">
                 <a:solidFill>
-                  <a:srgbClr val="B4D273"/>
+                  <a:srgbClr val="A6E22E"/>
                 </a:solidFill>
                 <a:latin typeface="Berlin Sans FB" panose="020E0602020502020306" pitchFamily="34" charset="0"/>
               </a:rPr>
@@ -4381,14 +4381,6 @@
               </a:rPr>
               <a:t>Results</a:t>
             </a:r>
-            <a:endParaRPr lang="en-US" sz="2900" dirty="0" smtClean="0">
-              <a:solidFill>
-                <a:srgbClr val="D6D6D6"/>
-              </a:solidFill>
-              <a:latin typeface="Gill Sans MT" panose="020B0502020104020203" pitchFamily="34" charset="0"/>
-              <a:ea typeface="Verdana" panose="020B0604030504040204" pitchFamily="34" charset="0"/>
-              <a:cs typeface="Verdana" panose="020B0604030504040204" pitchFamily="34" charset="0"/>
-            </a:endParaRPr>
           </a:p>
         </p:txBody>
       </p:sp>
@@ -4439,7 +4431,7 @@
             <a:r>
               <a:rPr lang="en-US" sz="4800" dirty="0" smtClean="0">
                 <a:solidFill>
-                  <a:srgbClr val="B4D273"/>
+                  <a:srgbClr val="A6E22E"/>
                 </a:solidFill>
                 <a:latin typeface="Berlin Sans FB" panose="020E0602020502020306" pitchFamily="34" charset="0"/>
               </a:rPr>
@@ -4775,7 +4767,7 @@
             <a:r>
               <a:rPr lang="en-US" sz="4800" dirty="0" smtClean="0">
                 <a:solidFill>
-                  <a:srgbClr val="B4D273"/>
+                  <a:srgbClr val="A6E22E"/>
                 </a:solidFill>
                 <a:latin typeface="Berlin Sans FB" panose="020E0602020502020306" pitchFamily="34" charset="0"/>
               </a:rPr>
@@ -5074,7 +5066,7 @@
             <a:r>
               <a:rPr lang="en-US" sz="4800" dirty="0" smtClean="0">
                 <a:solidFill>
-                  <a:srgbClr val="B4D273"/>
+                  <a:srgbClr val="A6E22E"/>
                 </a:solidFill>
                 <a:latin typeface="Berlin Sans FB" panose="020E0602020502020306" pitchFamily="34" charset="0"/>
               </a:rPr>
@@ -5368,7 +5360,7 @@
             <a:r>
               <a:rPr lang="en-US" sz="4800" dirty="0" smtClean="0">
                 <a:solidFill>
-                  <a:srgbClr val="B4D273"/>
+                  <a:srgbClr val="A6E22E"/>
                 </a:solidFill>
                 <a:latin typeface="Berlin Sans FB" panose="020E0602020502020306" pitchFamily="34" charset="0"/>
               </a:rPr>
@@ -5407,11 +5399,1899 @@
           </a:prstGeom>
         </p:spPr>
       </p:pic>
+      <p:grpSp>
+        <p:nvGrpSpPr>
+          <p:cNvPr id="123" name="Group 122"/>
+          <p:cNvGrpSpPr/>
+          <p:nvPr/>
+        </p:nvGrpSpPr>
+        <p:grpSpPr>
+          <a:xfrm>
+            <a:off x="9448800" y="10629900"/>
+            <a:ext cx="3291036" cy="3162300"/>
+            <a:chOff x="17864138" y="4724400"/>
+            <a:chExt cx="3291036" cy="3162300"/>
+          </a:xfrm>
+        </p:grpSpPr>
+        <p:sp>
+          <p:nvSpPr>
+            <p:cNvPr id="124" name="Oval 123"/>
+            <p:cNvSpPr/>
+            <p:nvPr/>
+          </p:nvSpPr>
+          <p:spPr>
+            <a:xfrm>
+              <a:off x="17864138" y="4724400"/>
+              <a:ext cx="308535" cy="291905"/>
+            </a:xfrm>
+            <a:prstGeom prst="ellipse">
+              <a:avLst/>
+            </a:prstGeom>
+            <a:noFill/>
+            <a:ln w="12700">
+              <a:solidFill>
+                <a:srgbClr val="D6D6D6"/>
+              </a:solidFill>
+            </a:ln>
+          </p:spPr>
+          <p:style>
+            <a:lnRef idx="2">
+              <a:schemeClr val="accent1">
+                <a:shade val="50000"/>
+              </a:schemeClr>
+            </a:lnRef>
+            <a:fillRef idx="1">
+              <a:schemeClr val="accent1"/>
+            </a:fillRef>
+            <a:effectRef idx="0">
+              <a:schemeClr val="accent1"/>
+            </a:effectRef>
+            <a:fontRef idx="minor">
+              <a:schemeClr val="lt1"/>
+            </a:fontRef>
+          </p:style>
+          <p:txBody>
+            <a:bodyPr rtlCol="0" anchor="ctr"/>
+            <a:lstStyle/>
+            <a:p>
+              <a:pPr algn="ctr"/>
+              <a:endParaRPr lang="en-US"/>
+            </a:p>
+          </p:txBody>
+        </p:sp>
+        <p:sp>
+          <p:nvSpPr>
+            <p:cNvPr id="125" name="Oval 124"/>
+            <p:cNvSpPr/>
+            <p:nvPr/>
+          </p:nvSpPr>
+          <p:spPr>
+            <a:xfrm>
+              <a:off x="17864138" y="5478487"/>
+              <a:ext cx="308535" cy="291905"/>
+            </a:xfrm>
+            <a:prstGeom prst="ellipse">
+              <a:avLst/>
+            </a:prstGeom>
+            <a:noFill/>
+            <a:ln w="12700">
+              <a:solidFill>
+                <a:srgbClr val="D6D6D6"/>
+              </a:solidFill>
+            </a:ln>
+          </p:spPr>
+          <p:style>
+            <a:lnRef idx="2">
+              <a:schemeClr val="accent1">
+                <a:shade val="50000"/>
+              </a:schemeClr>
+            </a:lnRef>
+            <a:fillRef idx="1">
+              <a:schemeClr val="accent1"/>
+            </a:fillRef>
+            <a:effectRef idx="0">
+              <a:schemeClr val="accent1"/>
+            </a:effectRef>
+            <a:fontRef idx="minor">
+              <a:schemeClr val="lt1"/>
+            </a:fontRef>
+          </p:style>
+          <p:txBody>
+            <a:bodyPr rtlCol="0" anchor="ctr"/>
+            <a:lstStyle/>
+            <a:p>
+              <a:pPr algn="ctr"/>
+              <a:endParaRPr lang="en-US"/>
+            </a:p>
+          </p:txBody>
+        </p:sp>
+        <p:sp>
+          <p:nvSpPr>
+            <p:cNvPr id="126" name="Oval 125"/>
+            <p:cNvSpPr/>
+            <p:nvPr/>
+          </p:nvSpPr>
+          <p:spPr>
+            <a:xfrm>
+              <a:off x="17864138" y="6256899"/>
+              <a:ext cx="308535" cy="291905"/>
+            </a:xfrm>
+            <a:prstGeom prst="ellipse">
+              <a:avLst/>
+            </a:prstGeom>
+            <a:noFill/>
+            <a:ln w="12700">
+              <a:solidFill>
+                <a:srgbClr val="D6D6D6"/>
+              </a:solidFill>
+            </a:ln>
+          </p:spPr>
+          <p:style>
+            <a:lnRef idx="2">
+              <a:schemeClr val="accent1">
+                <a:shade val="50000"/>
+              </a:schemeClr>
+            </a:lnRef>
+            <a:fillRef idx="1">
+              <a:schemeClr val="accent1"/>
+            </a:fillRef>
+            <a:effectRef idx="0">
+              <a:schemeClr val="accent1"/>
+            </a:effectRef>
+            <a:fontRef idx="minor">
+              <a:schemeClr val="lt1"/>
+            </a:fontRef>
+          </p:style>
+          <p:txBody>
+            <a:bodyPr rtlCol="0" anchor="ctr"/>
+            <a:lstStyle/>
+            <a:p>
+              <a:pPr algn="ctr"/>
+              <a:endParaRPr lang="en-US"/>
+            </a:p>
+          </p:txBody>
+        </p:sp>
+        <p:sp>
+          <p:nvSpPr>
+            <p:cNvPr id="127" name="Oval 126"/>
+            <p:cNvSpPr/>
+            <p:nvPr/>
+          </p:nvSpPr>
+          <p:spPr>
+            <a:xfrm>
+              <a:off x="17864138" y="7059636"/>
+              <a:ext cx="308535" cy="291905"/>
+            </a:xfrm>
+            <a:prstGeom prst="ellipse">
+              <a:avLst/>
+            </a:prstGeom>
+            <a:noFill/>
+            <a:ln w="12700">
+              <a:solidFill>
+                <a:srgbClr val="D6D6D6"/>
+              </a:solidFill>
+            </a:ln>
+          </p:spPr>
+          <p:style>
+            <a:lnRef idx="2">
+              <a:schemeClr val="accent1">
+                <a:shade val="50000"/>
+              </a:schemeClr>
+            </a:lnRef>
+            <a:fillRef idx="1">
+              <a:schemeClr val="accent1"/>
+            </a:fillRef>
+            <a:effectRef idx="0">
+              <a:schemeClr val="accent1"/>
+            </a:effectRef>
+            <a:fontRef idx="minor">
+              <a:schemeClr val="lt1"/>
+            </a:fontRef>
+          </p:style>
+          <p:txBody>
+            <a:bodyPr rtlCol="0" anchor="ctr"/>
+            <a:lstStyle/>
+            <a:p>
+              <a:pPr algn="ctr"/>
+              <a:endParaRPr lang="en-US"/>
+            </a:p>
+          </p:txBody>
+        </p:sp>
+        <p:cxnSp>
+          <p:nvCxnSpPr>
+            <p:cNvPr id="128" name="Curved Connector 127"/>
+            <p:cNvCxnSpPr>
+              <a:stCxn id="124" idx="4"/>
+            </p:cNvCxnSpPr>
+            <p:nvPr/>
+          </p:nvCxnSpPr>
+          <p:spPr>
+            <a:xfrm rot="5400000">
+              <a:off x="17787314" y="5247280"/>
+              <a:ext cx="462182" cy="4285"/>
+            </a:xfrm>
+            <a:prstGeom prst="curvedConnector3">
+              <a:avLst/>
+            </a:prstGeom>
+            <a:ln w="12700">
+              <a:solidFill>
+                <a:srgbClr val="D6D6D6"/>
+              </a:solidFill>
+              <a:tailEnd type="arrow"/>
+            </a:ln>
+          </p:spPr>
+          <p:style>
+            <a:lnRef idx="1">
+              <a:schemeClr val="accent1"/>
+            </a:lnRef>
+            <a:fillRef idx="0">
+              <a:schemeClr val="accent1"/>
+            </a:fillRef>
+            <a:effectRef idx="0">
+              <a:schemeClr val="accent1"/>
+            </a:effectRef>
+            <a:fontRef idx="minor">
+              <a:schemeClr val="tx1"/>
+            </a:fontRef>
+          </p:style>
+        </p:cxnSp>
+        <p:cxnSp>
+          <p:nvCxnSpPr>
+            <p:cNvPr id="129" name="Curved Connector 128"/>
+            <p:cNvCxnSpPr>
+              <a:stCxn id="125" idx="4"/>
+              <a:endCxn id="126" idx="0"/>
+            </p:cNvCxnSpPr>
+            <p:nvPr/>
+          </p:nvCxnSpPr>
+          <p:spPr>
+            <a:xfrm rot="5400000">
+              <a:off x="17775152" y="6013529"/>
+              <a:ext cx="486508" cy="4285"/>
+            </a:xfrm>
+            <a:prstGeom prst="curvedConnector3">
+              <a:avLst>
+                <a:gd name="adj1" fmla="val 50000"/>
+              </a:avLst>
+            </a:prstGeom>
+            <a:ln w="12700">
+              <a:solidFill>
+                <a:srgbClr val="D6D6D6"/>
+              </a:solidFill>
+              <a:tailEnd type="arrow"/>
+            </a:ln>
+          </p:spPr>
+          <p:style>
+            <a:lnRef idx="1">
+              <a:schemeClr val="accent1"/>
+            </a:lnRef>
+            <a:fillRef idx="0">
+              <a:schemeClr val="accent1"/>
+            </a:fillRef>
+            <a:effectRef idx="0">
+              <a:schemeClr val="accent1"/>
+            </a:effectRef>
+            <a:fontRef idx="minor">
+              <a:schemeClr val="tx1"/>
+            </a:fontRef>
+          </p:style>
+        </p:cxnSp>
+        <p:cxnSp>
+          <p:nvCxnSpPr>
+            <p:cNvPr id="130" name="Curved Connector 129"/>
+            <p:cNvCxnSpPr>
+              <a:stCxn id="126" idx="4"/>
+              <a:endCxn id="127" idx="0"/>
+            </p:cNvCxnSpPr>
+            <p:nvPr/>
+          </p:nvCxnSpPr>
+          <p:spPr>
+            <a:xfrm rot="5400000">
+              <a:off x="17762989" y="6804104"/>
+              <a:ext cx="510833" cy="4285"/>
+            </a:xfrm>
+            <a:prstGeom prst="curvedConnector3">
+              <a:avLst>
+                <a:gd name="adj1" fmla="val 50000"/>
+              </a:avLst>
+            </a:prstGeom>
+            <a:ln w="12700">
+              <a:solidFill>
+                <a:srgbClr val="D6D6D6"/>
+              </a:solidFill>
+              <a:tailEnd type="arrow"/>
+            </a:ln>
+          </p:spPr>
+          <p:style>
+            <a:lnRef idx="1">
+              <a:schemeClr val="accent1"/>
+            </a:lnRef>
+            <a:fillRef idx="0">
+              <a:schemeClr val="accent1"/>
+            </a:fillRef>
+            <a:effectRef idx="0">
+              <a:schemeClr val="accent1"/>
+            </a:effectRef>
+            <a:fontRef idx="minor">
+              <a:schemeClr val="tx1"/>
+            </a:fontRef>
+          </p:style>
+        </p:cxnSp>
+        <p:cxnSp>
+          <p:nvCxnSpPr>
+            <p:cNvPr id="131" name="Curved Connector 130"/>
+            <p:cNvCxnSpPr>
+              <a:stCxn id="124" idx="2"/>
+              <a:endCxn id="126" idx="2"/>
+            </p:cNvCxnSpPr>
+            <p:nvPr/>
+          </p:nvCxnSpPr>
+          <p:spPr>
+            <a:xfrm rot="10800000" flipV="1">
+              <a:off x="17864138" y="4870352"/>
+              <a:ext cx="4285" cy="1532499"/>
+            </a:xfrm>
+            <a:prstGeom prst="curvedConnector3">
+              <a:avLst>
+                <a:gd name="adj1" fmla="val 4650000"/>
+              </a:avLst>
+            </a:prstGeom>
+            <a:ln w="12700">
+              <a:solidFill>
+                <a:srgbClr val="D6D6D6"/>
+              </a:solidFill>
+              <a:tailEnd type="arrow"/>
+            </a:ln>
+          </p:spPr>
+          <p:style>
+            <a:lnRef idx="1">
+              <a:schemeClr val="accent1"/>
+            </a:lnRef>
+            <a:fillRef idx="0">
+              <a:schemeClr val="accent1"/>
+            </a:fillRef>
+            <a:effectRef idx="0">
+              <a:schemeClr val="accent1"/>
+            </a:effectRef>
+            <a:fontRef idx="minor">
+              <a:schemeClr val="tx1"/>
+            </a:fontRef>
+          </p:style>
+        </p:cxnSp>
+        <p:cxnSp>
+          <p:nvCxnSpPr>
+            <p:cNvPr id="132" name="Curved Connector 131"/>
+            <p:cNvCxnSpPr>
+              <a:stCxn id="124" idx="2"/>
+              <a:endCxn id="127" idx="2"/>
+            </p:cNvCxnSpPr>
+            <p:nvPr/>
+          </p:nvCxnSpPr>
+          <p:spPr>
+            <a:xfrm rot="10800000" flipV="1">
+              <a:off x="17864138" y="4870352"/>
+              <a:ext cx="4285" cy="2335236"/>
+            </a:xfrm>
+            <a:prstGeom prst="curvedConnector3">
+              <a:avLst>
+                <a:gd name="adj1" fmla="val 11400000"/>
+              </a:avLst>
+            </a:prstGeom>
+            <a:ln w="12700">
+              <a:solidFill>
+                <a:srgbClr val="D6D6D6"/>
+              </a:solidFill>
+              <a:tailEnd type="arrow"/>
+            </a:ln>
+          </p:spPr>
+          <p:style>
+            <a:lnRef idx="1">
+              <a:schemeClr val="accent1"/>
+            </a:lnRef>
+            <a:fillRef idx="0">
+              <a:schemeClr val="accent1"/>
+            </a:fillRef>
+            <a:effectRef idx="0">
+              <a:schemeClr val="accent1"/>
+            </a:effectRef>
+            <a:fontRef idx="minor">
+              <a:schemeClr val="tx1"/>
+            </a:fontRef>
+          </p:style>
+        </p:cxnSp>
+        <p:cxnSp>
+          <p:nvCxnSpPr>
+            <p:cNvPr id="133" name="Curved Connector 132"/>
+            <p:cNvCxnSpPr>
+              <a:stCxn id="125" idx="2"/>
+              <a:endCxn id="127" idx="2"/>
+            </p:cNvCxnSpPr>
+            <p:nvPr/>
+          </p:nvCxnSpPr>
+          <p:spPr>
+            <a:xfrm rot="10800000" flipV="1">
+              <a:off x="17864138" y="5624439"/>
+              <a:ext cx="4285" cy="1581150"/>
+            </a:xfrm>
+            <a:prstGeom prst="curvedConnector3">
+              <a:avLst>
+                <a:gd name="adj1" fmla="val 4650000"/>
+              </a:avLst>
+            </a:prstGeom>
+            <a:ln w="12700">
+              <a:solidFill>
+                <a:srgbClr val="D6D6D6"/>
+              </a:solidFill>
+              <a:tailEnd type="arrow"/>
+            </a:ln>
+          </p:spPr>
+          <p:style>
+            <a:lnRef idx="1">
+              <a:schemeClr val="accent1"/>
+            </a:lnRef>
+            <a:fillRef idx="0">
+              <a:schemeClr val="accent1"/>
+            </a:fillRef>
+            <a:effectRef idx="0">
+              <a:schemeClr val="accent1"/>
+            </a:effectRef>
+            <a:fontRef idx="minor">
+              <a:schemeClr val="tx1"/>
+            </a:fontRef>
+          </p:style>
+        </p:cxnSp>
+        <p:cxnSp>
+          <p:nvCxnSpPr>
+            <p:cNvPr id="134" name="Curved Connector 133"/>
+            <p:cNvCxnSpPr>
+              <a:stCxn id="127" idx="4"/>
+            </p:cNvCxnSpPr>
+            <p:nvPr/>
+          </p:nvCxnSpPr>
+          <p:spPr>
+            <a:xfrm rot="5400000">
+              <a:off x="17749755" y="7618049"/>
+              <a:ext cx="535158" cy="2143"/>
+            </a:xfrm>
+            <a:prstGeom prst="curvedConnector3">
+              <a:avLst>
+                <a:gd name="adj1" fmla="val 50000"/>
+              </a:avLst>
+            </a:prstGeom>
+            <a:ln w="12700">
+              <a:solidFill>
+                <a:srgbClr val="D6D6D6"/>
+              </a:solidFill>
+              <a:tailEnd type="arrow"/>
+            </a:ln>
+          </p:spPr>
+          <p:style>
+            <a:lnRef idx="1">
+              <a:schemeClr val="accent1"/>
+            </a:lnRef>
+            <a:fillRef idx="0">
+              <a:schemeClr val="accent1"/>
+            </a:fillRef>
+            <a:effectRef idx="0">
+              <a:schemeClr val="accent1"/>
+            </a:effectRef>
+            <a:fontRef idx="minor">
+              <a:schemeClr val="tx1"/>
+            </a:fontRef>
+          </p:style>
+        </p:cxnSp>
+        <p:sp>
+          <p:nvSpPr>
+            <p:cNvPr id="135" name="Oval 134"/>
+            <p:cNvSpPr/>
+            <p:nvPr/>
+          </p:nvSpPr>
+          <p:spPr>
+            <a:xfrm>
+              <a:off x="18995432" y="4724400"/>
+              <a:ext cx="308535" cy="291905"/>
+            </a:xfrm>
+            <a:prstGeom prst="ellipse">
+              <a:avLst/>
+            </a:prstGeom>
+            <a:noFill/>
+            <a:ln w="12700">
+              <a:solidFill>
+                <a:srgbClr val="D6D6D6"/>
+              </a:solidFill>
+            </a:ln>
+          </p:spPr>
+          <p:style>
+            <a:lnRef idx="2">
+              <a:schemeClr val="accent1">
+                <a:shade val="50000"/>
+              </a:schemeClr>
+            </a:lnRef>
+            <a:fillRef idx="1">
+              <a:schemeClr val="accent1"/>
+            </a:fillRef>
+            <a:effectRef idx="0">
+              <a:schemeClr val="accent1"/>
+            </a:effectRef>
+            <a:fontRef idx="minor">
+              <a:schemeClr val="lt1"/>
+            </a:fontRef>
+          </p:style>
+          <p:txBody>
+            <a:bodyPr rtlCol="0" anchor="ctr"/>
+            <a:lstStyle/>
+            <a:p>
+              <a:pPr algn="ctr"/>
+              <a:endParaRPr lang="en-US"/>
+            </a:p>
+          </p:txBody>
+        </p:sp>
+        <p:sp>
+          <p:nvSpPr>
+            <p:cNvPr id="136" name="Oval 135"/>
+            <p:cNvSpPr/>
+            <p:nvPr/>
+          </p:nvSpPr>
+          <p:spPr>
+            <a:xfrm>
+              <a:off x="18995432" y="5478487"/>
+              <a:ext cx="308535" cy="291905"/>
+            </a:xfrm>
+            <a:prstGeom prst="ellipse">
+              <a:avLst/>
+            </a:prstGeom>
+            <a:noFill/>
+            <a:ln w="12700">
+              <a:solidFill>
+                <a:srgbClr val="D6D6D6"/>
+              </a:solidFill>
+            </a:ln>
+          </p:spPr>
+          <p:style>
+            <a:lnRef idx="2">
+              <a:schemeClr val="accent1">
+                <a:shade val="50000"/>
+              </a:schemeClr>
+            </a:lnRef>
+            <a:fillRef idx="1">
+              <a:schemeClr val="accent1"/>
+            </a:fillRef>
+            <a:effectRef idx="0">
+              <a:schemeClr val="accent1"/>
+            </a:effectRef>
+            <a:fontRef idx="minor">
+              <a:schemeClr val="lt1"/>
+            </a:fontRef>
+          </p:style>
+          <p:txBody>
+            <a:bodyPr rtlCol="0" anchor="ctr"/>
+            <a:lstStyle/>
+            <a:p>
+              <a:pPr algn="ctr"/>
+              <a:endParaRPr lang="en-US"/>
+            </a:p>
+          </p:txBody>
+        </p:sp>
+        <p:sp>
+          <p:nvSpPr>
+            <p:cNvPr id="137" name="Oval 136"/>
+            <p:cNvSpPr/>
+            <p:nvPr/>
+          </p:nvSpPr>
+          <p:spPr>
+            <a:xfrm>
+              <a:off x="18995432" y="6256899"/>
+              <a:ext cx="308535" cy="291905"/>
+            </a:xfrm>
+            <a:prstGeom prst="ellipse">
+              <a:avLst/>
+            </a:prstGeom>
+            <a:noFill/>
+            <a:ln w="12700">
+              <a:solidFill>
+                <a:srgbClr val="D6D6D6"/>
+              </a:solidFill>
+            </a:ln>
+          </p:spPr>
+          <p:style>
+            <a:lnRef idx="2">
+              <a:schemeClr val="accent1">
+                <a:shade val="50000"/>
+              </a:schemeClr>
+            </a:lnRef>
+            <a:fillRef idx="1">
+              <a:schemeClr val="accent1"/>
+            </a:fillRef>
+            <a:effectRef idx="0">
+              <a:schemeClr val="accent1"/>
+            </a:effectRef>
+            <a:fontRef idx="minor">
+              <a:schemeClr val="lt1"/>
+            </a:fontRef>
+          </p:style>
+          <p:txBody>
+            <a:bodyPr rtlCol="0" anchor="ctr"/>
+            <a:lstStyle/>
+            <a:p>
+              <a:pPr algn="ctr"/>
+              <a:endParaRPr lang="en-US"/>
+            </a:p>
+          </p:txBody>
+        </p:sp>
+        <p:sp>
+          <p:nvSpPr>
+            <p:cNvPr id="138" name="Oval 137"/>
+            <p:cNvSpPr/>
+            <p:nvPr/>
+          </p:nvSpPr>
+          <p:spPr>
+            <a:xfrm>
+              <a:off x="18995432" y="7059636"/>
+              <a:ext cx="308535" cy="291905"/>
+            </a:xfrm>
+            <a:prstGeom prst="ellipse">
+              <a:avLst/>
+            </a:prstGeom>
+            <a:noFill/>
+            <a:ln w="12700">
+              <a:solidFill>
+                <a:srgbClr val="D6D6D6"/>
+              </a:solidFill>
+            </a:ln>
+          </p:spPr>
+          <p:style>
+            <a:lnRef idx="2">
+              <a:schemeClr val="accent1">
+                <a:shade val="50000"/>
+              </a:schemeClr>
+            </a:lnRef>
+            <a:fillRef idx="1">
+              <a:schemeClr val="accent1"/>
+            </a:fillRef>
+            <a:effectRef idx="0">
+              <a:schemeClr val="accent1"/>
+            </a:effectRef>
+            <a:fontRef idx="minor">
+              <a:schemeClr val="lt1"/>
+            </a:fontRef>
+          </p:style>
+          <p:txBody>
+            <a:bodyPr rtlCol="0" anchor="ctr"/>
+            <a:lstStyle/>
+            <a:p>
+              <a:pPr algn="ctr"/>
+              <a:endParaRPr lang="en-US"/>
+            </a:p>
+          </p:txBody>
+        </p:sp>
+        <p:cxnSp>
+          <p:nvCxnSpPr>
+            <p:cNvPr id="139" name="Curved Connector 138"/>
+            <p:cNvCxnSpPr>
+              <a:stCxn id="135" idx="4"/>
+            </p:cNvCxnSpPr>
+            <p:nvPr/>
+          </p:nvCxnSpPr>
+          <p:spPr>
+            <a:xfrm rot="5400000">
+              <a:off x="18918608" y="5247280"/>
+              <a:ext cx="462182" cy="4285"/>
+            </a:xfrm>
+            <a:prstGeom prst="curvedConnector3">
+              <a:avLst/>
+            </a:prstGeom>
+            <a:ln w="12700">
+              <a:solidFill>
+                <a:srgbClr val="D6D6D6"/>
+              </a:solidFill>
+              <a:tailEnd type="arrow"/>
+            </a:ln>
+          </p:spPr>
+          <p:style>
+            <a:lnRef idx="1">
+              <a:schemeClr val="accent1"/>
+            </a:lnRef>
+            <a:fillRef idx="0">
+              <a:schemeClr val="accent1"/>
+            </a:fillRef>
+            <a:effectRef idx="0">
+              <a:schemeClr val="accent1"/>
+            </a:effectRef>
+            <a:fontRef idx="minor">
+              <a:schemeClr val="tx1"/>
+            </a:fontRef>
+          </p:style>
+        </p:cxnSp>
+        <p:cxnSp>
+          <p:nvCxnSpPr>
+            <p:cNvPr id="140" name="Curved Connector 139"/>
+            <p:cNvCxnSpPr>
+              <a:stCxn id="136" idx="4"/>
+              <a:endCxn id="137" idx="0"/>
+            </p:cNvCxnSpPr>
+            <p:nvPr/>
+          </p:nvCxnSpPr>
+          <p:spPr>
+            <a:xfrm rot="5400000">
+              <a:off x="18906445" y="6013529"/>
+              <a:ext cx="486508" cy="4285"/>
+            </a:xfrm>
+            <a:prstGeom prst="curvedConnector3">
+              <a:avLst>
+                <a:gd name="adj1" fmla="val 50000"/>
+              </a:avLst>
+            </a:prstGeom>
+            <a:ln w="12700">
+              <a:solidFill>
+                <a:srgbClr val="D6D6D6"/>
+              </a:solidFill>
+              <a:tailEnd type="arrow"/>
+            </a:ln>
+          </p:spPr>
+          <p:style>
+            <a:lnRef idx="1">
+              <a:schemeClr val="accent1"/>
+            </a:lnRef>
+            <a:fillRef idx="0">
+              <a:schemeClr val="accent1"/>
+            </a:fillRef>
+            <a:effectRef idx="0">
+              <a:schemeClr val="accent1"/>
+            </a:effectRef>
+            <a:fontRef idx="minor">
+              <a:schemeClr val="tx1"/>
+            </a:fontRef>
+          </p:style>
+        </p:cxnSp>
+        <p:cxnSp>
+          <p:nvCxnSpPr>
+            <p:cNvPr id="141" name="Curved Connector 140"/>
+            <p:cNvCxnSpPr>
+              <a:stCxn id="137" idx="4"/>
+              <a:endCxn id="138" idx="0"/>
+            </p:cNvCxnSpPr>
+            <p:nvPr/>
+          </p:nvCxnSpPr>
+          <p:spPr>
+            <a:xfrm rot="5400000">
+              <a:off x="18894282" y="6804104"/>
+              <a:ext cx="510833" cy="4285"/>
+            </a:xfrm>
+            <a:prstGeom prst="curvedConnector3">
+              <a:avLst>
+                <a:gd name="adj1" fmla="val 50000"/>
+              </a:avLst>
+            </a:prstGeom>
+            <a:ln w="12700">
+              <a:solidFill>
+                <a:srgbClr val="D6D6D6"/>
+              </a:solidFill>
+              <a:tailEnd type="arrow"/>
+            </a:ln>
+          </p:spPr>
+          <p:style>
+            <a:lnRef idx="1">
+              <a:schemeClr val="accent1"/>
+            </a:lnRef>
+            <a:fillRef idx="0">
+              <a:schemeClr val="accent1"/>
+            </a:fillRef>
+            <a:effectRef idx="0">
+              <a:schemeClr val="accent1"/>
+            </a:effectRef>
+            <a:fontRef idx="minor">
+              <a:schemeClr val="tx1"/>
+            </a:fontRef>
+          </p:style>
+        </p:cxnSp>
+        <p:cxnSp>
+          <p:nvCxnSpPr>
+            <p:cNvPr id="142" name="Curved Connector 141"/>
+            <p:cNvCxnSpPr>
+              <a:stCxn id="135" idx="2"/>
+              <a:endCxn id="137" idx="2"/>
+            </p:cNvCxnSpPr>
+            <p:nvPr/>
+          </p:nvCxnSpPr>
+          <p:spPr>
+            <a:xfrm rot="10800000" flipV="1">
+              <a:off x="18995432" y="4870352"/>
+              <a:ext cx="4285" cy="1532499"/>
+            </a:xfrm>
+            <a:prstGeom prst="curvedConnector3">
+              <a:avLst>
+                <a:gd name="adj1" fmla="val 4650000"/>
+              </a:avLst>
+            </a:prstGeom>
+            <a:ln w="12700">
+              <a:solidFill>
+                <a:srgbClr val="D6D6D6"/>
+              </a:solidFill>
+              <a:tailEnd type="arrow"/>
+            </a:ln>
+          </p:spPr>
+          <p:style>
+            <a:lnRef idx="1">
+              <a:schemeClr val="accent1"/>
+            </a:lnRef>
+            <a:fillRef idx="0">
+              <a:schemeClr val="accent1"/>
+            </a:fillRef>
+            <a:effectRef idx="0">
+              <a:schemeClr val="accent1"/>
+            </a:effectRef>
+            <a:fontRef idx="minor">
+              <a:schemeClr val="tx1"/>
+            </a:fontRef>
+          </p:style>
+        </p:cxnSp>
+        <p:cxnSp>
+          <p:nvCxnSpPr>
+            <p:cNvPr id="143" name="Curved Connector 142"/>
+            <p:cNvCxnSpPr>
+              <a:stCxn id="135" idx="2"/>
+              <a:endCxn id="138" idx="2"/>
+            </p:cNvCxnSpPr>
+            <p:nvPr/>
+          </p:nvCxnSpPr>
+          <p:spPr>
+            <a:xfrm rot="10800000" flipV="1">
+              <a:off x="18995432" y="4870352"/>
+              <a:ext cx="4285" cy="2335236"/>
+            </a:xfrm>
+            <a:prstGeom prst="curvedConnector3">
+              <a:avLst>
+                <a:gd name="adj1" fmla="val 11400000"/>
+              </a:avLst>
+            </a:prstGeom>
+            <a:ln w="12700">
+              <a:solidFill>
+                <a:srgbClr val="D6D6D6"/>
+              </a:solidFill>
+              <a:tailEnd type="arrow"/>
+            </a:ln>
+          </p:spPr>
+          <p:style>
+            <a:lnRef idx="1">
+              <a:schemeClr val="accent1"/>
+            </a:lnRef>
+            <a:fillRef idx="0">
+              <a:schemeClr val="accent1"/>
+            </a:fillRef>
+            <a:effectRef idx="0">
+              <a:schemeClr val="accent1"/>
+            </a:effectRef>
+            <a:fontRef idx="minor">
+              <a:schemeClr val="tx1"/>
+            </a:fontRef>
+          </p:style>
+        </p:cxnSp>
+        <p:cxnSp>
+          <p:nvCxnSpPr>
+            <p:cNvPr id="144" name="Curved Connector 143"/>
+            <p:cNvCxnSpPr>
+              <a:stCxn id="136" idx="2"/>
+              <a:endCxn id="138" idx="2"/>
+            </p:cNvCxnSpPr>
+            <p:nvPr/>
+          </p:nvCxnSpPr>
+          <p:spPr>
+            <a:xfrm rot="10800000" flipV="1">
+              <a:off x="18995432" y="5624439"/>
+              <a:ext cx="4285" cy="1581150"/>
+            </a:xfrm>
+            <a:prstGeom prst="curvedConnector3">
+              <a:avLst>
+                <a:gd name="adj1" fmla="val 4650000"/>
+              </a:avLst>
+            </a:prstGeom>
+            <a:ln w="12700">
+              <a:solidFill>
+                <a:srgbClr val="D6D6D6"/>
+              </a:solidFill>
+              <a:tailEnd type="arrow"/>
+            </a:ln>
+          </p:spPr>
+          <p:style>
+            <a:lnRef idx="1">
+              <a:schemeClr val="accent1"/>
+            </a:lnRef>
+            <a:fillRef idx="0">
+              <a:schemeClr val="accent1"/>
+            </a:fillRef>
+            <a:effectRef idx="0">
+              <a:schemeClr val="accent1"/>
+            </a:effectRef>
+            <a:fontRef idx="minor">
+              <a:schemeClr val="tx1"/>
+            </a:fontRef>
+          </p:style>
+        </p:cxnSp>
+        <p:cxnSp>
+          <p:nvCxnSpPr>
+            <p:cNvPr id="145" name="Curved Connector 144"/>
+            <p:cNvCxnSpPr>
+              <a:stCxn id="138" idx="4"/>
+            </p:cNvCxnSpPr>
+            <p:nvPr/>
+          </p:nvCxnSpPr>
+          <p:spPr>
+            <a:xfrm rot="5400000">
+              <a:off x="18881048" y="7618049"/>
+              <a:ext cx="535158" cy="2143"/>
+            </a:xfrm>
+            <a:prstGeom prst="curvedConnector3">
+              <a:avLst>
+                <a:gd name="adj1" fmla="val 50000"/>
+              </a:avLst>
+            </a:prstGeom>
+            <a:ln w="12700">
+              <a:solidFill>
+                <a:srgbClr val="D6D6D6"/>
+              </a:solidFill>
+              <a:tailEnd type="arrow"/>
+            </a:ln>
+          </p:spPr>
+          <p:style>
+            <a:lnRef idx="1">
+              <a:schemeClr val="accent1"/>
+            </a:lnRef>
+            <a:fillRef idx="0">
+              <a:schemeClr val="accent1"/>
+            </a:fillRef>
+            <a:effectRef idx="0">
+              <a:schemeClr val="accent1"/>
+            </a:effectRef>
+            <a:fontRef idx="minor">
+              <a:schemeClr val="tx1"/>
+            </a:fontRef>
+          </p:style>
+        </p:cxnSp>
+        <p:sp>
+          <p:nvSpPr>
+            <p:cNvPr id="146" name="Oval 145"/>
+            <p:cNvSpPr/>
+            <p:nvPr/>
+          </p:nvSpPr>
+          <p:spPr>
+            <a:xfrm>
+              <a:off x="20126726" y="4724400"/>
+              <a:ext cx="308535" cy="291905"/>
+            </a:xfrm>
+            <a:prstGeom prst="ellipse">
+              <a:avLst/>
+            </a:prstGeom>
+            <a:noFill/>
+            <a:ln w="12700">
+              <a:solidFill>
+                <a:srgbClr val="D6D6D6"/>
+              </a:solidFill>
+            </a:ln>
+          </p:spPr>
+          <p:style>
+            <a:lnRef idx="2">
+              <a:schemeClr val="accent1">
+                <a:shade val="50000"/>
+              </a:schemeClr>
+            </a:lnRef>
+            <a:fillRef idx="1">
+              <a:schemeClr val="accent1"/>
+            </a:fillRef>
+            <a:effectRef idx="0">
+              <a:schemeClr val="accent1"/>
+            </a:effectRef>
+            <a:fontRef idx="minor">
+              <a:schemeClr val="lt1"/>
+            </a:fontRef>
+          </p:style>
+          <p:txBody>
+            <a:bodyPr rtlCol="0" anchor="ctr"/>
+            <a:lstStyle/>
+            <a:p>
+              <a:pPr algn="ctr"/>
+              <a:endParaRPr lang="en-US"/>
+            </a:p>
+          </p:txBody>
+        </p:sp>
+        <p:sp>
+          <p:nvSpPr>
+            <p:cNvPr id="147" name="Oval 146"/>
+            <p:cNvSpPr/>
+            <p:nvPr/>
+          </p:nvSpPr>
+          <p:spPr>
+            <a:xfrm>
+              <a:off x="20126726" y="5478487"/>
+              <a:ext cx="308535" cy="291905"/>
+            </a:xfrm>
+            <a:prstGeom prst="ellipse">
+              <a:avLst/>
+            </a:prstGeom>
+            <a:noFill/>
+            <a:ln w="12700">
+              <a:solidFill>
+                <a:srgbClr val="D6D6D6"/>
+              </a:solidFill>
+            </a:ln>
+          </p:spPr>
+          <p:style>
+            <a:lnRef idx="2">
+              <a:schemeClr val="accent1">
+                <a:shade val="50000"/>
+              </a:schemeClr>
+            </a:lnRef>
+            <a:fillRef idx="1">
+              <a:schemeClr val="accent1"/>
+            </a:fillRef>
+            <a:effectRef idx="0">
+              <a:schemeClr val="accent1"/>
+            </a:effectRef>
+            <a:fontRef idx="minor">
+              <a:schemeClr val="lt1"/>
+            </a:fontRef>
+          </p:style>
+          <p:txBody>
+            <a:bodyPr rtlCol="0" anchor="ctr"/>
+            <a:lstStyle/>
+            <a:p>
+              <a:pPr algn="ctr"/>
+              <a:endParaRPr lang="en-US"/>
+            </a:p>
+          </p:txBody>
+        </p:sp>
+        <p:sp>
+          <p:nvSpPr>
+            <p:cNvPr id="148" name="Oval 147"/>
+            <p:cNvSpPr/>
+            <p:nvPr/>
+          </p:nvSpPr>
+          <p:spPr>
+            <a:xfrm>
+              <a:off x="20126726" y="6256899"/>
+              <a:ext cx="308535" cy="291905"/>
+            </a:xfrm>
+            <a:prstGeom prst="ellipse">
+              <a:avLst/>
+            </a:prstGeom>
+            <a:noFill/>
+            <a:ln w="12700">
+              <a:solidFill>
+                <a:srgbClr val="D6D6D6"/>
+              </a:solidFill>
+            </a:ln>
+          </p:spPr>
+          <p:style>
+            <a:lnRef idx="2">
+              <a:schemeClr val="accent1">
+                <a:shade val="50000"/>
+              </a:schemeClr>
+            </a:lnRef>
+            <a:fillRef idx="1">
+              <a:schemeClr val="accent1"/>
+            </a:fillRef>
+            <a:effectRef idx="0">
+              <a:schemeClr val="accent1"/>
+            </a:effectRef>
+            <a:fontRef idx="minor">
+              <a:schemeClr val="lt1"/>
+            </a:fontRef>
+          </p:style>
+          <p:txBody>
+            <a:bodyPr rtlCol="0" anchor="ctr"/>
+            <a:lstStyle/>
+            <a:p>
+              <a:pPr algn="ctr"/>
+              <a:endParaRPr lang="en-US"/>
+            </a:p>
+          </p:txBody>
+        </p:sp>
+        <p:sp>
+          <p:nvSpPr>
+            <p:cNvPr id="149" name="Oval 148"/>
+            <p:cNvSpPr/>
+            <p:nvPr/>
+          </p:nvSpPr>
+          <p:spPr>
+            <a:xfrm>
+              <a:off x="20126726" y="7059636"/>
+              <a:ext cx="308535" cy="291905"/>
+            </a:xfrm>
+            <a:prstGeom prst="ellipse">
+              <a:avLst/>
+            </a:prstGeom>
+            <a:noFill/>
+            <a:ln w="12700">
+              <a:solidFill>
+                <a:srgbClr val="D6D6D6"/>
+              </a:solidFill>
+            </a:ln>
+          </p:spPr>
+          <p:style>
+            <a:lnRef idx="2">
+              <a:schemeClr val="accent1">
+                <a:shade val="50000"/>
+              </a:schemeClr>
+            </a:lnRef>
+            <a:fillRef idx="1">
+              <a:schemeClr val="accent1"/>
+            </a:fillRef>
+            <a:effectRef idx="0">
+              <a:schemeClr val="accent1"/>
+            </a:effectRef>
+            <a:fontRef idx="minor">
+              <a:schemeClr val="lt1"/>
+            </a:fontRef>
+          </p:style>
+          <p:txBody>
+            <a:bodyPr rtlCol="0" anchor="ctr"/>
+            <a:lstStyle/>
+            <a:p>
+              <a:pPr algn="ctr"/>
+              <a:endParaRPr lang="en-US"/>
+            </a:p>
+          </p:txBody>
+        </p:sp>
+        <p:cxnSp>
+          <p:nvCxnSpPr>
+            <p:cNvPr id="150" name="Curved Connector 149"/>
+            <p:cNvCxnSpPr>
+              <a:stCxn id="146" idx="4"/>
+            </p:cNvCxnSpPr>
+            <p:nvPr/>
+          </p:nvCxnSpPr>
+          <p:spPr>
+            <a:xfrm rot="5400000">
+              <a:off x="20049902" y="5247280"/>
+              <a:ext cx="462182" cy="4285"/>
+            </a:xfrm>
+            <a:prstGeom prst="curvedConnector3">
+              <a:avLst/>
+            </a:prstGeom>
+            <a:ln w="12700">
+              <a:solidFill>
+                <a:srgbClr val="D6D6D6"/>
+              </a:solidFill>
+              <a:tailEnd type="arrow"/>
+            </a:ln>
+          </p:spPr>
+          <p:style>
+            <a:lnRef idx="1">
+              <a:schemeClr val="accent1"/>
+            </a:lnRef>
+            <a:fillRef idx="0">
+              <a:schemeClr val="accent1"/>
+            </a:fillRef>
+            <a:effectRef idx="0">
+              <a:schemeClr val="accent1"/>
+            </a:effectRef>
+            <a:fontRef idx="minor">
+              <a:schemeClr val="tx1"/>
+            </a:fontRef>
+          </p:style>
+        </p:cxnSp>
+        <p:cxnSp>
+          <p:nvCxnSpPr>
+            <p:cNvPr id="151" name="Curved Connector 150"/>
+            <p:cNvCxnSpPr>
+              <a:stCxn id="147" idx="4"/>
+              <a:endCxn id="148" idx="0"/>
+            </p:cNvCxnSpPr>
+            <p:nvPr/>
+          </p:nvCxnSpPr>
+          <p:spPr>
+            <a:xfrm rot="5400000">
+              <a:off x="20037739" y="6013529"/>
+              <a:ext cx="486508" cy="4285"/>
+            </a:xfrm>
+            <a:prstGeom prst="curvedConnector3">
+              <a:avLst>
+                <a:gd name="adj1" fmla="val 50000"/>
+              </a:avLst>
+            </a:prstGeom>
+            <a:ln w="12700">
+              <a:solidFill>
+                <a:srgbClr val="D6D6D6"/>
+              </a:solidFill>
+              <a:tailEnd type="arrow"/>
+            </a:ln>
+          </p:spPr>
+          <p:style>
+            <a:lnRef idx="1">
+              <a:schemeClr val="accent1"/>
+            </a:lnRef>
+            <a:fillRef idx="0">
+              <a:schemeClr val="accent1"/>
+            </a:fillRef>
+            <a:effectRef idx="0">
+              <a:schemeClr val="accent1"/>
+            </a:effectRef>
+            <a:fontRef idx="minor">
+              <a:schemeClr val="tx1"/>
+            </a:fontRef>
+          </p:style>
+        </p:cxnSp>
+        <p:cxnSp>
+          <p:nvCxnSpPr>
+            <p:cNvPr id="152" name="Curved Connector 151"/>
+            <p:cNvCxnSpPr>
+              <a:stCxn id="148" idx="4"/>
+              <a:endCxn id="149" idx="0"/>
+            </p:cNvCxnSpPr>
+            <p:nvPr/>
+          </p:nvCxnSpPr>
+          <p:spPr>
+            <a:xfrm rot="5400000">
+              <a:off x="20025576" y="6804104"/>
+              <a:ext cx="510833" cy="4285"/>
+            </a:xfrm>
+            <a:prstGeom prst="curvedConnector3">
+              <a:avLst>
+                <a:gd name="adj1" fmla="val 50000"/>
+              </a:avLst>
+            </a:prstGeom>
+            <a:ln w="12700">
+              <a:solidFill>
+                <a:srgbClr val="D6D6D6"/>
+              </a:solidFill>
+              <a:tailEnd type="arrow"/>
+            </a:ln>
+          </p:spPr>
+          <p:style>
+            <a:lnRef idx="1">
+              <a:schemeClr val="accent1"/>
+            </a:lnRef>
+            <a:fillRef idx="0">
+              <a:schemeClr val="accent1"/>
+            </a:fillRef>
+            <a:effectRef idx="0">
+              <a:schemeClr val="accent1"/>
+            </a:effectRef>
+            <a:fontRef idx="minor">
+              <a:schemeClr val="tx1"/>
+            </a:fontRef>
+          </p:style>
+        </p:cxnSp>
+        <p:cxnSp>
+          <p:nvCxnSpPr>
+            <p:cNvPr id="153" name="Curved Connector 152"/>
+            <p:cNvCxnSpPr>
+              <a:stCxn id="146" idx="2"/>
+              <a:endCxn id="148" idx="2"/>
+            </p:cNvCxnSpPr>
+            <p:nvPr/>
+          </p:nvCxnSpPr>
+          <p:spPr>
+            <a:xfrm rot="10800000" flipV="1">
+              <a:off x="20126726" y="4870352"/>
+              <a:ext cx="4285" cy="1532499"/>
+            </a:xfrm>
+            <a:prstGeom prst="curvedConnector3">
+              <a:avLst>
+                <a:gd name="adj1" fmla="val 4650000"/>
+              </a:avLst>
+            </a:prstGeom>
+            <a:ln w="12700">
+              <a:solidFill>
+                <a:srgbClr val="D6D6D6"/>
+              </a:solidFill>
+              <a:tailEnd type="arrow"/>
+            </a:ln>
+          </p:spPr>
+          <p:style>
+            <a:lnRef idx="1">
+              <a:schemeClr val="accent1"/>
+            </a:lnRef>
+            <a:fillRef idx="0">
+              <a:schemeClr val="accent1"/>
+            </a:fillRef>
+            <a:effectRef idx="0">
+              <a:schemeClr val="accent1"/>
+            </a:effectRef>
+            <a:fontRef idx="minor">
+              <a:schemeClr val="tx1"/>
+            </a:fontRef>
+          </p:style>
+        </p:cxnSp>
+        <p:cxnSp>
+          <p:nvCxnSpPr>
+            <p:cNvPr id="154" name="Curved Connector 153"/>
+            <p:cNvCxnSpPr>
+              <a:stCxn id="146" idx="2"/>
+              <a:endCxn id="149" idx="2"/>
+            </p:cNvCxnSpPr>
+            <p:nvPr/>
+          </p:nvCxnSpPr>
+          <p:spPr>
+            <a:xfrm rot="10800000" flipV="1">
+              <a:off x="20126726" y="4870352"/>
+              <a:ext cx="4285" cy="2335236"/>
+            </a:xfrm>
+            <a:prstGeom prst="curvedConnector3">
+              <a:avLst>
+                <a:gd name="adj1" fmla="val 11400000"/>
+              </a:avLst>
+            </a:prstGeom>
+            <a:ln w="12700">
+              <a:solidFill>
+                <a:srgbClr val="D6D6D6"/>
+              </a:solidFill>
+              <a:tailEnd type="arrow"/>
+            </a:ln>
+          </p:spPr>
+          <p:style>
+            <a:lnRef idx="1">
+              <a:schemeClr val="accent1"/>
+            </a:lnRef>
+            <a:fillRef idx="0">
+              <a:schemeClr val="accent1"/>
+            </a:fillRef>
+            <a:effectRef idx="0">
+              <a:schemeClr val="accent1"/>
+            </a:effectRef>
+            <a:fontRef idx="minor">
+              <a:schemeClr val="tx1"/>
+            </a:fontRef>
+          </p:style>
+        </p:cxnSp>
+        <p:cxnSp>
+          <p:nvCxnSpPr>
+            <p:cNvPr id="155" name="Curved Connector 154"/>
+            <p:cNvCxnSpPr>
+              <a:stCxn id="147" idx="2"/>
+              <a:endCxn id="149" idx="2"/>
+            </p:cNvCxnSpPr>
+            <p:nvPr/>
+          </p:nvCxnSpPr>
+          <p:spPr>
+            <a:xfrm rot="10800000" flipV="1">
+              <a:off x="20126726" y="5624439"/>
+              <a:ext cx="4285" cy="1581150"/>
+            </a:xfrm>
+            <a:prstGeom prst="curvedConnector3">
+              <a:avLst>
+                <a:gd name="adj1" fmla="val 4650000"/>
+              </a:avLst>
+            </a:prstGeom>
+            <a:ln w="12700">
+              <a:solidFill>
+                <a:srgbClr val="D6D6D6"/>
+              </a:solidFill>
+              <a:tailEnd type="arrow"/>
+            </a:ln>
+          </p:spPr>
+          <p:style>
+            <a:lnRef idx="1">
+              <a:schemeClr val="accent1"/>
+            </a:lnRef>
+            <a:fillRef idx="0">
+              <a:schemeClr val="accent1"/>
+            </a:fillRef>
+            <a:effectRef idx="0">
+              <a:schemeClr val="accent1"/>
+            </a:effectRef>
+            <a:fontRef idx="minor">
+              <a:schemeClr val="tx1"/>
+            </a:fontRef>
+          </p:style>
+        </p:cxnSp>
+        <p:cxnSp>
+          <p:nvCxnSpPr>
+            <p:cNvPr id="156" name="Curved Connector 155"/>
+            <p:cNvCxnSpPr>
+              <a:stCxn id="149" idx="4"/>
+            </p:cNvCxnSpPr>
+            <p:nvPr/>
+          </p:nvCxnSpPr>
+          <p:spPr>
+            <a:xfrm rot="5400000">
+              <a:off x="20012342" y="7618049"/>
+              <a:ext cx="535158" cy="2143"/>
+            </a:xfrm>
+            <a:prstGeom prst="curvedConnector3">
+              <a:avLst>
+                <a:gd name="adj1" fmla="val 50000"/>
+              </a:avLst>
+            </a:prstGeom>
+            <a:ln w="12700">
+              <a:solidFill>
+                <a:srgbClr val="D6D6D6"/>
+              </a:solidFill>
+              <a:tailEnd type="arrow"/>
+            </a:ln>
+          </p:spPr>
+          <p:style>
+            <a:lnRef idx="1">
+              <a:schemeClr val="accent1"/>
+            </a:lnRef>
+            <a:fillRef idx="0">
+              <a:schemeClr val="accent1"/>
+            </a:fillRef>
+            <a:effectRef idx="0">
+              <a:schemeClr val="accent1"/>
+            </a:effectRef>
+            <a:fontRef idx="minor">
+              <a:schemeClr val="tx1"/>
+            </a:fontRef>
+          </p:style>
+        </p:cxnSp>
+        <p:cxnSp>
+          <p:nvCxnSpPr>
+            <p:cNvPr id="157" name="Curved Connector 156"/>
+            <p:cNvCxnSpPr>
+              <a:stCxn id="124" idx="6"/>
+              <a:endCxn id="135" idx="2"/>
+            </p:cNvCxnSpPr>
+            <p:nvPr/>
+          </p:nvCxnSpPr>
+          <p:spPr>
+            <a:xfrm>
+              <a:off x="18172673" y="4870352"/>
+              <a:ext cx="822759" cy="4054"/>
+            </a:xfrm>
+            <a:prstGeom prst="curvedConnector3">
+              <a:avLst>
+                <a:gd name="adj1" fmla="val 50000"/>
+              </a:avLst>
+            </a:prstGeom>
+            <a:ln w="12700">
+              <a:solidFill>
+                <a:srgbClr val="D6D6D6"/>
+              </a:solidFill>
+              <a:tailEnd type="arrow"/>
+            </a:ln>
+          </p:spPr>
+          <p:style>
+            <a:lnRef idx="1">
+              <a:schemeClr val="accent1"/>
+            </a:lnRef>
+            <a:fillRef idx="0">
+              <a:schemeClr val="accent1"/>
+            </a:fillRef>
+            <a:effectRef idx="0">
+              <a:schemeClr val="accent1"/>
+            </a:effectRef>
+            <a:fontRef idx="minor">
+              <a:schemeClr val="tx1"/>
+            </a:fontRef>
+          </p:style>
+        </p:cxnSp>
+        <p:cxnSp>
+          <p:nvCxnSpPr>
+            <p:cNvPr id="158" name="Curved Connector 157"/>
+            <p:cNvCxnSpPr>
+              <a:stCxn id="135" idx="6"/>
+              <a:endCxn id="146" idx="2"/>
+            </p:cNvCxnSpPr>
+            <p:nvPr/>
+          </p:nvCxnSpPr>
+          <p:spPr>
+            <a:xfrm>
+              <a:off x="19303966" y="4870352"/>
+              <a:ext cx="822759" cy="4054"/>
+            </a:xfrm>
+            <a:prstGeom prst="curvedConnector3">
+              <a:avLst>
+                <a:gd name="adj1" fmla="val 50000"/>
+              </a:avLst>
+            </a:prstGeom>
+            <a:ln w="12700">
+              <a:solidFill>
+                <a:srgbClr val="D6D6D6"/>
+              </a:solidFill>
+              <a:tailEnd type="arrow"/>
+            </a:ln>
+          </p:spPr>
+          <p:style>
+            <a:lnRef idx="1">
+              <a:schemeClr val="accent1"/>
+            </a:lnRef>
+            <a:fillRef idx="0">
+              <a:schemeClr val="accent1"/>
+            </a:fillRef>
+            <a:effectRef idx="0">
+              <a:schemeClr val="accent1"/>
+            </a:effectRef>
+            <a:fontRef idx="minor">
+              <a:schemeClr val="tx1"/>
+            </a:fontRef>
+          </p:style>
+        </p:cxnSp>
+        <p:cxnSp>
+          <p:nvCxnSpPr>
+            <p:cNvPr id="159" name="Curved Connector 158"/>
+            <p:cNvCxnSpPr>
+              <a:stCxn id="146" idx="6"/>
+            </p:cNvCxnSpPr>
+            <p:nvPr/>
+          </p:nvCxnSpPr>
+          <p:spPr>
+            <a:xfrm>
+              <a:off x="20435260" y="4870352"/>
+              <a:ext cx="719914" cy="4054"/>
+            </a:xfrm>
+            <a:prstGeom prst="curvedConnector3">
+              <a:avLst>
+                <a:gd name="adj1" fmla="val 50000"/>
+              </a:avLst>
+            </a:prstGeom>
+            <a:ln w="12700">
+              <a:solidFill>
+                <a:srgbClr val="D6D6D6"/>
+              </a:solidFill>
+              <a:tailEnd type="arrow"/>
+            </a:ln>
+          </p:spPr>
+          <p:style>
+            <a:lnRef idx="1">
+              <a:schemeClr val="accent1"/>
+            </a:lnRef>
+            <a:fillRef idx="0">
+              <a:schemeClr val="accent1"/>
+            </a:fillRef>
+            <a:effectRef idx="0">
+              <a:schemeClr val="accent1"/>
+            </a:effectRef>
+            <a:fontRef idx="minor">
+              <a:schemeClr val="tx1"/>
+            </a:fontRef>
+          </p:style>
+        </p:cxnSp>
+        <p:cxnSp>
+          <p:nvCxnSpPr>
+            <p:cNvPr id="160" name="Curved Connector 159"/>
+            <p:cNvCxnSpPr>
+              <a:stCxn id="125" idx="6"/>
+              <a:endCxn id="136" idx="2"/>
+            </p:cNvCxnSpPr>
+            <p:nvPr/>
+          </p:nvCxnSpPr>
+          <p:spPr>
+            <a:xfrm>
+              <a:off x="18172673" y="5624439"/>
+              <a:ext cx="822759" cy="4054"/>
+            </a:xfrm>
+            <a:prstGeom prst="curvedConnector3">
+              <a:avLst>
+                <a:gd name="adj1" fmla="val 50000"/>
+              </a:avLst>
+            </a:prstGeom>
+            <a:ln w="12700">
+              <a:solidFill>
+                <a:srgbClr val="D6D6D6"/>
+              </a:solidFill>
+              <a:tailEnd type="arrow"/>
+            </a:ln>
+          </p:spPr>
+          <p:style>
+            <a:lnRef idx="1">
+              <a:schemeClr val="accent1"/>
+            </a:lnRef>
+            <a:fillRef idx="0">
+              <a:schemeClr val="accent1"/>
+            </a:fillRef>
+            <a:effectRef idx="0">
+              <a:schemeClr val="accent1"/>
+            </a:effectRef>
+            <a:fontRef idx="minor">
+              <a:schemeClr val="tx1"/>
+            </a:fontRef>
+          </p:style>
+        </p:cxnSp>
+        <p:cxnSp>
+          <p:nvCxnSpPr>
+            <p:cNvPr id="161" name="Curved Connector 160"/>
+            <p:cNvCxnSpPr>
+              <a:stCxn id="136" idx="6"/>
+              <a:endCxn id="147" idx="2"/>
+            </p:cNvCxnSpPr>
+            <p:nvPr/>
+          </p:nvCxnSpPr>
+          <p:spPr>
+            <a:xfrm>
+              <a:off x="19303966" y="5624439"/>
+              <a:ext cx="822759" cy="4054"/>
+            </a:xfrm>
+            <a:prstGeom prst="curvedConnector3">
+              <a:avLst>
+                <a:gd name="adj1" fmla="val 50000"/>
+              </a:avLst>
+            </a:prstGeom>
+            <a:ln w="12700">
+              <a:solidFill>
+                <a:srgbClr val="D6D6D6"/>
+              </a:solidFill>
+              <a:tailEnd type="arrow"/>
+            </a:ln>
+          </p:spPr>
+          <p:style>
+            <a:lnRef idx="1">
+              <a:schemeClr val="accent1"/>
+            </a:lnRef>
+            <a:fillRef idx="0">
+              <a:schemeClr val="accent1"/>
+            </a:fillRef>
+            <a:effectRef idx="0">
+              <a:schemeClr val="accent1"/>
+            </a:effectRef>
+            <a:fontRef idx="minor">
+              <a:schemeClr val="tx1"/>
+            </a:fontRef>
+          </p:style>
+        </p:cxnSp>
+        <p:cxnSp>
+          <p:nvCxnSpPr>
+            <p:cNvPr id="162" name="Curved Connector 161"/>
+            <p:cNvCxnSpPr>
+              <a:stCxn id="147" idx="6"/>
+            </p:cNvCxnSpPr>
+            <p:nvPr/>
+          </p:nvCxnSpPr>
+          <p:spPr>
+            <a:xfrm>
+              <a:off x="20435260" y="5624439"/>
+              <a:ext cx="719914" cy="4054"/>
+            </a:xfrm>
+            <a:prstGeom prst="curvedConnector3">
+              <a:avLst>
+                <a:gd name="adj1" fmla="val 50000"/>
+              </a:avLst>
+            </a:prstGeom>
+            <a:ln w="12700">
+              <a:solidFill>
+                <a:srgbClr val="D6D6D6"/>
+              </a:solidFill>
+              <a:tailEnd type="arrow"/>
+            </a:ln>
+          </p:spPr>
+          <p:style>
+            <a:lnRef idx="1">
+              <a:schemeClr val="accent1"/>
+            </a:lnRef>
+            <a:fillRef idx="0">
+              <a:schemeClr val="accent1"/>
+            </a:fillRef>
+            <a:effectRef idx="0">
+              <a:schemeClr val="accent1"/>
+            </a:effectRef>
+            <a:fontRef idx="minor">
+              <a:schemeClr val="tx1"/>
+            </a:fontRef>
+          </p:style>
+        </p:cxnSp>
+        <p:cxnSp>
+          <p:nvCxnSpPr>
+            <p:cNvPr id="163" name="Curved Connector 162"/>
+            <p:cNvCxnSpPr/>
+            <p:nvPr/>
+          </p:nvCxnSpPr>
+          <p:spPr>
+            <a:xfrm>
+              <a:off x="18166245" y="6390688"/>
+              <a:ext cx="822759" cy="4054"/>
+            </a:xfrm>
+            <a:prstGeom prst="curvedConnector3">
+              <a:avLst>
+                <a:gd name="adj1" fmla="val 50000"/>
+              </a:avLst>
+            </a:prstGeom>
+            <a:ln w="12700">
+              <a:solidFill>
+                <a:srgbClr val="D6D6D6"/>
+              </a:solidFill>
+              <a:tailEnd type="arrow"/>
+            </a:ln>
+          </p:spPr>
+          <p:style>
+            <a:lnRef idx="1">
+              <a:schemeClr val="accent1"/>
+            </a:lnRef>
+            <a:fillRef idx="0">
+              <a:schemeClr val="accent1"/>
+            </a:fillRef>
+            <a:effectRef idx="0">
+              <a:schemeClr val="accent1"/>
+            </a:effectRef>
+            <a:fontRef idx="minor">
+              <a:schemeClr val="tx1"/>
+            </a:fontRef>
+          </p:style>
+        </p:cxnSp>
+        <p:cxnSp>
+          <p:nvCxnSpPr>
+            <p:cNvPr id="164" name="Curved Connector 163"/>
+            <p:cNvCxnSpPr/>
+            <p:nvPr/>
+          </p:nvCxnSpPr>
+          <p:spPr>
+            <a:xfrm>
+              <a:off x="19297538" y="6390688"/>
+              <a:ext cx="822759" cy="4054"/>
+            </a:xfrm>
+            <a:prstGeom prst="curvedConnector3">
+              <a:avLst>
+                <a:gd name="adj1" fmla="val 50000"/>
+              </a:avLst>
+            </a:prstGeom>
+            <a:ln w="12700">
+              <a:solidFill>
+                <a:srgbClr val="D6D6D6"/>
+              </a:solidFill>
+              <a:tailEnd type="arrow"/>
+            </a:ln>
+          </p:spPr>
+          <p:style>
+            <a:lnRef idx="1">
+              <a:schemeClr val="accent1"/>
+            </a:lnRef>
+            <a:fillRef idx="0">
+              <a:schemeClr val="accent1"/>
+            </a:fillRef>
+            <a:effectRef idx="0">
+              <a:schemeClr val="accent1"/>
+            </a:effectRef>
+            <a:fontRef idx="minor">
+              <a:schemeClr val="tx1"/>
+            </a:fontRef>
+          </p:style>
+        </p:cxnSp>
+        <p:cxnSp>
+          <p:nvCxnSpPr>
+            <p:cNvPr id="165" name="Curved Connector 164"/>
+            <p:cNvCxnSpPr/>
+            <p:nvPr/>
+          </p:nvCxnSpPr>
+          <p:spPr>
+            <a:xfrm>
+              <a:off x="20428832" y="6390688"/>
+              <a:ext cx="719914" cy="4054"/>
+            </a:xfrm>
+            <a:prstGeom prst="curvedConnector3">
+              <a:avLst>
+                <a:gd name="adj1" fmla="val 50000"/>
+              </a:avLst>
+            </a:prstGeom>
+            <a:ln w="12700">
+              <a:solidFill>
+                <a:srgbClr val="D6D6D6"/>
+              </a:solidFill>
+              <a:tailEnd type="arrow"/>
+            </a:ln>
+          </p:spPr>
+          <p:style>
+            <a:lnRef idx="1">
+              <a:schemeClr val="accent1"/>
+            </a:lnRef>
+            <a:fillRef idx="0">
+              <a:schemeClr val="accent1"/>
+            </a:fillRef>
+            <a:effectRef idx="0">
+              <a:schemeClr val="accent1"/>
+            </a:effectRef>
+            <a:fontRef idx="minor">
+              <a:schemeClr val="tx1"/>
+            </a:fontRef>
+          </p:style>
+        </p:cxnSp>
+        <p:cxnSp>
+          <p:nvCxnSpPr>
+            <p:cNvPr id="166" name="Curved Connector 165"/>
+            <p:cNvCxnSpPr/>
+            <p:nvPr/>
+          </p:nvCxnSpPr>
+          <p:spPr>
+            <a:xfrm>
+              <a:off x="18166244" y="7205588"/>
+              <a:ext cx="822759" cy="4054"/>
+            </a:xfrm>
+            <a:prstGeom prst="curvedConnector3">
+              <a:avLst>
+                <a:gd name="adj1" fmla="val 50000"/>
+              </a:avLst>
+            </a:prstGeom>
+            <a:ln w="12700">
+              <a:solidFill>
+                <a:srgbClr val="D6D6D6"/>
+              </a:solidFill>
+              <a:tailEnd type="arrow"/>
+            </a:ln>
+          </p:spPr>
+          <p:style>
+            <a:lnRef idx="1">
+              <a:schemeClr val="accent1"/>
+            </a:lnRef>
+            <a:fillRef idx="0">
+              <a:schemeClr val="accent1"/>
+            </a:fillRef>
+            <a:effectRef idx="0">
+              <a:schemeClr val="accent1"/>
+            </a:effectRef>
+            <a:fontRef idx="minor">
+              <a:schemeClr val="tx1"/>
+            </a:fontRef>
+          </p:style>
+        </p:cxnSp>
+        <p:cxnSp>
+          <p:nvCxnSpPr>
+            <p:cNvPr id="167" name="Curved Connector 166"/>
+            <p:cNvCxnSpPr/>
+            <p:nvPr/>
+          </p:nvCxnSpPr>
+          <p:spPr>
+            <a:xfrm>
+              <a:off x="19297538" y="7205588"/>
+              <a:ext cx="822759" cy="4054"/>
+            </a:xfrm>
+            <a:prstGeom prst="curvedConnector3">
+              <a:avLst>
+                <a:gd name="adj1" fmla="val 50000"/>
+              </a:avLst>
+            </a:prstGeom>
+            <a:ln w="12700">
+              <a:solidFill>
+                <a:srgbClr val="D6D6D6"/>
+              </a:solidFill>
+              <a:tailEnd type="arrow"/>
+            </a:ln>
+          </p:spPr>
+          <p:style>
+            <a:lnRef idx="1">
+              <a:schemeClr val="accent1"/>
+            </a:lnRef>
+            <a:fillRef idx="0">
+              <a:schemeClr val="accent1"/>
+            </a:fillRef>
+            <a:effectRef idx="0">
+              <a:schemeClr val="accent1"/>
+            </a:effectRef>
+            <a:fontRef idx="minor">
+              <a:schemeClr val="tx1"/>
+            </a:fontRef>
+          </p:style>
+        </p:cxnSp>
+        <p:cxnSp>
+          <p:nvCxnSpPr>
+            <p:cNvPr id="168" name="Curved Connector 167"/>
+            <p:cNvCxnSpPr/>
+            <p:nvPr/>
+          </p:nvCxnSpPr>
+          <p:spPr>
+            <a:xfrm>
+              <a:off x="20428832" y="7205588"/>
+              <a:ext cx="719914" cy="4054"/>
+            </a:xfrm>
+            <a:prstGeom prst="curvedConnector3">
+              <a:avLst>
+                <a:gd name="adj1" fmla="val 50000"/>
+              </a:avLst>
+            </a:prstGeom>
+            <a:ln w="12700">
+              <a:solidFill>
+                <a:srgbClr val="D6D6D6"/>
+              </a:solidFill>
+              <a:tailEnd type="arrow"/>
+            </a:ln>
+          </p:spPr>
+          <p:style>
+            <a:lnRef idx="1">
+              <a:schemeClr val="accent1"/>
+            </a:lnRef>
+            <a:fillRef idx="0">
+              <a:schemeClr val="accent1"/>
+            </a:fillRef>
+            <a:effectRef idx="0">
+              <a:schemeClr val="accent1"/>
+            </a:effectRef>
+            <a:fontRef idx="minor">
+              <a:schemeClr val="tx1"/>
+            </a:fontRef>
+          </p:style>
+        </p:cxnSp>
+      </p:grpSp>
       <p:pic>
         <p:nvPicPr>
-          <p:cNvPr id="8" name="Picture 7"/>
+          <p:cNvPr id="1026" name="Picture 2" descr="C:\Users\Sicheng\Documents\Robot_music\images\testing.png"/>
           <p:cNvPicPr>
-            <a:picLocks noChangeAspect="1"/>
+            <a:picLocks noChangeAspect="1" noChangeArrowheads="1"/>
           </p:cNvPicPr>
           <p:nvPr/>
         </p:nvPicPr>
@@ -5423,23 +7303,34 @@
               </a:ext>
             </a:extLst>
           </a:blip>
+          <a:srcRect/>
           <a:stretch>
             <a:fillRect/>
           </a:stretch>
         </p:blipFill>
-        <p:spPr>
+        <p:spPr bwMode="auto">
           <a:xfrm>
-            <a:off x="3277790" y="9829800"/>
-            <a:ext cx="7543800" cy="4626864"/>
+            <a:off x="1314450" y="9982200"/>
+            <a:ext cx="7143750" cy="4381500"/>
           </a:xfrm>
           <a:prstGeom prst="rect">
             <a:avLst/>
           </a:prstGeom>
+          <a:noFill/>
           <a:ln w="38100">
             <a:solidFill>
               <a:srgbClr val="9E86C8"/>
             </a:solidFill>
           </a:ln>
+          <a:extLst>
+            <a:ext uri="{909E8E84-426E-40DD-AFC4-6F175D3DCCD1}">
+              <a14:hiddenFill xmlns:a14="http://schemas.microsoft.com/office/drawing/2010/main">
+                <a:solidFill>
+                  <a:srgbClr val="FFFFFF"/>
+                </a:solidFill>
+              </a14:hiddenFill>
+            </a:ext>
+          </a:extLst>
         </p:spPr>
       </p:pic>
     </p:spTree>
@@ -5447,6 +7338,13 @@
   <p:clrMapOvr>
     <a:masterClrMapping/>
   </p:clrMapOvr>
+  <p:timing>
+    <p:tnLst>
+      <p:par>
+        <p:cTn id="1" dur="indefinite" restart="never" nodeType="tmRoot"/>
+      </p:par>
+    </p:tnLst>
+  </p:timing>
 </p:sld>
 </file>
 

</xml_diff>

<commit_message>
Updated the poster board with result graphs
</commit_message>
<xml_diff>
--- a/poster_RobotMusic.pptx
+++ b/poster_RobotMusic.pptx
@@ -107,6 +107,22 @@
       </a:defRPr>
     </a:lvl9pPr>
   </p:defaultTextStyle>
+  <p:extLst>
+    <p:ext uri="{EFAFB233-063F-42B5-8137-9DF3F51BA10A}">
+      <p15:sldGuideLst xmlns:p15="http://schemas.microsoft.com/office/powerpoint/2012/main">
+        <p15:guide id="1" orient="horz" pos="3024">
+          <p15:clr>
+            <a:srgbClr val="A4A3A4"/>
+          </p15:clr>
+        </p15:guide>
+        <p15:guide id="2" pos="8640">
+          <p15:clr>
+            <a:srgbClr val="A4A3A4"/>
+          </p15:clr>
+        </p15:guide>
+      </p15:sldGuideLst>
+    </p:ext>
+  </p:extLst>
 </p:presentation>
 </file>
 
@@ -193,7 +209,7 @@
             <a:fld id="{4361C05B-F879-4EA7-BFF1-EE2A2ABEF247}" type="datetimeFigureOut">
               <a:rPr lang="en-US" smtClean="0"/>
               <a:pPr/>
-              <a:t>12/3/2017</a:t>
+              <a:t>12/4/17</a:t>
             </a:fld>
             <a:endParaRPr lang="en-US"/>
           </a:p>
@@ -511,7 +527,7 @@
         <p:spPr/>
         <p:txBody>
           <a:bodyPr>
-            <a:normAutofit lnSpcReduction="10000"/>
+            <a:normAutofit/>
           </a:bodyPr>
           <a:lstStyle/>
           <a:p>
@@ -733,7 +749,7 @@
             <a:fld id="{086B26D7-AFFB-49F6-B585-7F46FFE1B55E}" type="datetimeFigureOut">
               <a:rPr lang="en-US" smtClean="0"/>
               <a:pPr/>
-              <a:t>12/3/2017</a:t>
+              <a:t>12/4/17</a:t>
             </a:fld>
             <a:endParaRPr lang="en-US"/>
           </a:p>
@@ -900,7 +916,7 @@
             <a:fld id="{086B26D7-AFFB-49F6-B585-7F46FFE1B55E}" type="datetimeFigureOut">
               <a:rPr lang="en-US" smtClean="0"/>
               <a:pPr/>
-              <a:t>12/3/2017</a:t>
+              <a:t>12/4/17</a:t>
             </a:fld>
             <a:endParaRPr lang="en-US"/>
           </a:p>
@@ -1077,7 +1093,7 @@
             <a:fld id="{086B26D7-AFFB-49F6-B585-7F46FFE1B55E}" type="datetimeFigureOut">
               <a:rPr lang="en-US" smtClean="0"/>
               <a:pPr/>
-              <a:t>12/3/2017</a:t>
+              <a:t>12/4/17</a:t>
             </a:fld>
             <a:endParaRPr lang="en-US"/>
           </a:p>
@@ -1244,7 +1260,7 @@
             <a:fld id="{086B26D7-AFFB-49F6-B585-7F46FFE1B55E}" type="datetimeFigureOut">
               <a:rPr lang="en-US" smtClean="0"/>
               <a:pPr/>
-              <a:t>12/3/2017</a:t>
+              <a:t>12/4/17</a:t>
             </a:fld>
             <a:endParaRPr lang="en-US"/>
           </a:p>
@@ -1487,7 +1503,7 @@
             <a:fld id="{086B26D7-AFFB-49F6-B585-7F46FFE1B55E}" type="datetimeFigureOut">
               <a:rPr lang="en-US" smtClean="0"/>
               <a:pPr/>
-              <a:t>12/3/2017</a:t>
+              <a:t>12/4/17</a:t>
             </a:fld>
             <a:endParaRPr lang="en-US"/>
           </a:p>
@@ -1772,7 +1788,7 @@
             <a:fld id="{086B26D7-AFFB-49F6-B585-7F46FFE1B55E}" type="datetimeFigureOut">
               <a:rPr lang="en-US" smtClean="0"/>
               <a:pPr/>
-              <a:t>12/3/2017</a:t>
+              <a:t>12/4/17</a:t>
             </a:fld>
             <a:endParaRPr lang="en-US"/>
           </a:p>
@@ -2196,7 +2212,7 @@
             <a:fld id="{086B26D7-AFFB-49F6-B585-7F46FFE1B55E}" type="datetimeFigureOut">
               <a:rPr lang="en-US" smtClean="0"/>
               <a:pPr/>
-              <a:t>12/3/2017</a:t>
+              <a:t>12/4/17</a:t>
             </a:fld>
             <a:endParaRPr lang="en-US"/>
           </a:p>
@@ -2311,7 +2327,7 @@
             <a:fld id="{086B26D7-AFFB-49F6-B585-7F46FFE1B55E}" type="datetimeFigureOut">
               <a:rPr lang="en-US" smtClean="0"/>
               <a:pPr/>
-              <a:t>12/3/2017</a:t>
+              <a:t>12/4/17</a:t>
             </a:fld>
             <a:endParaRPr lang="en-US"/>
           </a:p>
@@ -2403,7 +2419,7 @@
             <a:fld id="{086B26D7-AFFB-49F6-B585-7F46FFE1B55E}" type="datetimeFigureOut">
               <a:rPr lang="en-US" smtClean="0"/>
               <a:pPr/>
-              <a:t>12/3/2017</a:t>
+              <a:t>12/4/17</a:t>
             </a:fld>
             <a:endParaRPr lang="en-US"/>
           </a:p>
@@ -2677,7 +2693,7 @@
             <a:fld id="{086B26D7-AFFB-49F6-B585-7F46FFE1B55E}" type="datetimeFigureOut">
               <a:rPr lang="en-US" smtClean="0"/>
               <a:pPr/>
-              <a:t>12/3/2017</a:t>
+              <a:t>12/4/17</a:t>
             </a:fld>
             <a:endParaRPr lang="en-US"/>
           </a:p>
@@ -2927,7 +2943,7 @@
             <a:fld id="{086B26D7-AFFB-49F6-B585-7F46FFE1B55E}" type="datetimeFigureOut">
               <a:rPr lang="en-US" smtClean="0"/>
               <a:pPr/>
-              <a:t>12/3/2017</a:t>
+              <a:t>12/4/17</a:t>
             </a:fld>
             <a:endParaRPr lang="en-US"/>
           </a:p>
@@ -3137,7 +3153,7 @@
             <a:fld id="{086B26D7-AFFB-49F6-B585-7F46FFE1B55E}" type="datetimeFigureOut">
               <a:rPr lang="en-US" smtClean="0"/>
               <a:pPr/>
-              <a:t>12/3/2017</a:t>
+              <a:t>12/4/17</a:t>
             </a:fld>
             <a:endParaRPr lang="en-US"/>
           </a:p>
@@ -4184,8 +4200,8 @@
         </p:nvSpPr>
         <p:spPr>
           <a:xfrm>
-            <a:off x="14173200" y="9644729"/>
-            <a:ext cx="12344399" cy="1358609"/>
+            <a:off x="14173201" y="13791378"/>
+            <a:ext cx="12344399" cy="823078"/>
           </a:xfrm>
           <a:prstGeom prst="rect">
             <a:avLst/>
@@ -4356,31 +4372,14 @@
           </a:lstStyle>
           <a:p>
             <a:pPr algn="just"/>
-            <a:r>
-              <a:rPr lang="en-US" sz="2900" dirty="0" smtClean="0">
-                <a:solidFill>
-                  <a:srgbClr val="D6D6D6"/>
-                </a:solidFill>
-                <a:latin typeface="Gill Sans MT" panose="020B0502020104020203" pitchFamily="34" charset="0"/>
-                <a:ea typeface="Verdana" panose="020B0604030504040204" pitchFamily="34" charset="0"/>
-                <a:cs typeface="Verdana" panose="020B0604030504040204" pitchFamily="34" charset="0"/>
-              </a:rPr>
-              <a:t>Results</a:t>
-            </a:r>
-          </a:p>
-          <a:p>
-            <a:pPr algn="just"/>
-            <a:r>
-              <a:rPr lang="en-US" sz="2900" dirty="0" smtClean="0">
-                <a:solidFill>
-                  <a:srgbClr val="D6D6D6"/>
-                </a:solidFill>
-                <a:latin typeface="Gill Sans MT" panose="020B0502020104020203" pitchFamily="34" charset="0"/>
-                <a:ea typeface="Verdana" panose="020B0604030504040204" pitchFamily="34" charset="0"/>
-                <a:cs typeface="Verdana" panose="020B0604030504040204" pitchFamily="34" charset="0"/>
-              </a:rPr>
-              <a:t>Results</a:t>
-            </a:r>
+            <a:endParaRPr lang="en-US" sz="2900" dirty="0" smtClean="0">
+              <a:solidFill>
+                <a:srgbClr val="D6D6D6"/>
+              </a:solidFill>
+              <a:latin typeface="Gill Sans MT" panose="020B0502020104020203" pitchFamily="34" charset="0"/>
+              <a:ea typeface="Verdana" panose="020B0604030504040204" pitchFamily="34" charset="0"/>
+              <a:cs typeface="Verdana" panose="020B0604030504040204" pitchFamily="34" charset="0"/>
+            </a:endParaRPr>
           </a:p>
         </p:txBody>
       </p:sp>
@@ -4392,7 +4391,7 @@
         </p:nvSpPr>
         <p:spPr>
           <a:xfrm>
-            <a:off x="14173200" y="8501729"/>
+            <a:off x="14173200" y="8758165"/>
             <a:ext cx="12344400" cy="848577"/>
           </a:xfrm>
           <a:prstGeom prst="rect">
@@ -5085,8 +5084,8 @@
         </p:nvSpPr>
         <p:spPr>
           <a:xfrm>
-            <a:off x="14173200" y="15477328"/>
-            <a:ext cx="12344399" cy="2429672"/>
+            <a:off x="14158168" y="15995491"/>
+            <a:ext cx="12344399" cy="1894141"/>
           </a:xfrm>
           <a:prstGeom prst="rect">
             <a:avLst/>
@@ -5286,7 +5285,7 @@
           <a:p>
             <a:pPr algn="just"/>
             <a:r>
-              <a:rPr lang="en-US" sz="2900" dirty="0" smtClean="0">
+              <a:rPr lang="en-US" sz="2900" dirty="0" err="1" smtClean="0">
                 <a:solidFill>
                   <a:srgbClr val="D6D6D6"/>
                 </a:solidFill>
@@ -5294,22 +5293,16 @@
                 <a:ea typeface="Verdana" panose="020B0604030504040204" pitchFamily="34" charset="0"/>
                 <a:cs typeface="Verdana" panose="020B0604030504040204" pitchFamily="34" charset="0"/>
               </a:rPr>
-              <a:t>Results</a:t>
-            </a:r>
-          </a:p>
-          <a:p>
-            <a:pPr algn="just"/>
-            <a:r>
-              <a:rPr lang="en-US" sz="2900" dirty="0" smtClean="0">
-                <a:solidFill>
-                  <a:srgbClr val="D6D6D6"/>
-                </a:solidFill>
-                <a:latin typeface="Gill Sans MT" panose="020B0502020104020203" pitchFamily="34" charset="0"/>
-                <a:ea typeface="Verdana" panose="020B0604030504040204" pitchFamily="34" charset="0"/>
-                <a:cs typeface="Verdana" panose="020B0604030504040204" pitchFamily="34" charset="0"/>
-              </a:rPr>
-              <a:t>Conclusion</a:t>
-            </a:r>
+              <a:t>ResultsConclusion</a:t>
+            </a:r>
+            <a:endParaRPr lang="en-US" sz="2900" dirty="0" smtClean="0">
+              <a:solidFill>
+                <a:srgbClr val="D6D6D6"/>
+              </a:solidFill>
+              <a:latin typeface="Gill Sans MT" panose="020B0502020104020203" pitchFamily="34" charset="0"/>
+              <a:ea typeface="Verdana" panose="020B0604030504040204" pitchFamily="34" charset="0"/>
+              <a:cs typeface="Verdana" panose="020B0604030504040204" pitchFamily="34" charset="0"/>
+            </a:endParaRPr>
           </a:p>
         </p:txBody>
       </p:sp>
@@ -5321,7 +5314,7 @@
         </p:nvSpPr>
         <p:spPr>
           <a:xfrm>
-            <a:off x="14173200" y="14334328"/>
+            <a:off x="14173200" y="14840305"/>
             <a:ext cx="12344400" cy="848577"/>
           </a:xfrm>
           <a:prstGeom prst="rect">
@@ -5391,7 +5384,7 @@
         </p:blipFill>
         <p:spPr>
           <a:xfrm>
-            <a:off x="15316200" y="11353800"/>
+            <a:off x="7987905" y="10184418"/>
             <a:ext cx="10058400" cy="2729602"/>
           </a:xfrm>
           <a:prstGeom prst="rect">
@@ -7333,6 +7326,198 @@
           </a:extLst>
         </p:spPr>
       </p:pic>
+      <p:pic>
+        <p:nvPicPr>
+          <p:cNvPr id="3" name="Picture 2"/>
+          <p:cNvPicPr>
+            <a:picLocks noChangeAspect="1"/>
+          </p:cNvPicPr>
+          <p:nvPr/>
+        </p:nvPicPr>
+        <p:blipFill>
+          <a:blip r:embed="rId7">
+            <a:extLst>
+              <a:ext uri="{28A0092B-C50C-407E-A947-70E740481C1C}">
+                <a14:useLocalDpi xmlns:a14="http://schemas.microsoft.com/office/drawing/2010/main" val="0"/>
+              </a:ext>
+            </a:extLst>
+          </a:blip>
+          <a:stretch>
+            <a:fillRect/>
+          </a:stretch>
+        </p:blipFill>
+        <p:spPr>
+          <a:xfrm>
+            <a:off x="14168554" y="9989442"/>
+            <a:ext cx="5883202" cy="3449727"/>
+          </a:xfrm>
+          <a:prstGeom prst="rect">
+            <a:avLst/>
+          </a:prstGeom>
+        </p:spPr>
+      </p:pic>
+      <p:pic>
+        <p:nvPicPr>
+          <p:cNvPr id="5" name="Picture 4"/>
+          <p:cNvPicPr>
+            <a:picLocks noChangeAspect="1"/>
+          </p:cNvPicPr>
+          <p:nvPr/>
+        </p:nvPicPr>
+        <p:blipFill>
+          <a:blip r:embed="rId8">
+            <a:extLst>
+              <a:ext uri="{28A0092B-C50C-407E-A947-70E740481C1C}">
+                <a14:useLocalDpi xmlns:a14="http://schemas.microsoft.com/office/drawing/2010/main" val="0"/>
+              </a:ext>
+            </a:extLst>
+          </a:blip>
+          <a:stretch>
+            <a:fillRect/>
+          </a:stretch>
+        </p:blipFill>
+        <p:spPr>
+          <a:xfrm>
+            <a:off x="20815074" y="9938388"/>
+            <a:ext cx="5599262" cy="3494575"/>
+          </a:xfrm>
+          <a:prstGeom prst="rect">
+            <a:avLst/>
+          </a:prstGeom>
+        </p:spPr>
+      </p:pic>
+      <p:sp>
+        <p:nvSpPr>
+          <p:cNvPr id="6" name="TextBox 5"/>
+          <p:cNvSpPr txBox="1"/>
+          <p:nvPr/>
+        </p:nvSpPr>
+        <p:spPr>
+          <a:xfrm>
+            <a:off x="14830942" y="10494146"/>
+            <a:ext cx="5220814" cy="353943"/>
+          </a:xfrm>
+          <a:prstGeom prst="rect">
+            <a:avLst/>
+          </a:prstGeom>
+          <a:noFill/>
+        </p:spPr>
+        <p:txBody>
+          <a:bodyPr wrap="square" rtlCol="0">
+            <a:spAutoFit/>
+          </a:bodyPr>
+          <a:lstStyle/>
+          <a:p>
+            <a:r>
+              <a:rPr lang="en-US" sz="1700" dirty="0" smtClean="0">
+                <a:solidFill>
+                  <a:schemeClr val="bg1"/>
+                </a:solidFill>
+                <a:latin typeface="Gill Sans MT" charset="0"/>
+                <a:ea typeface="Gill Sans MT" charset="0"/>
+                <a:cs typeface="Gill Sans MT" charset="0"/>
+              </a:rPr>
+              <a:t>Mean: 4.273                                                   </a:t>
+            </a:r>
+            <a:r>
+              <a:rPr lang="en-US" sz="1700" dirty="0" err="1" smtClean="0">
+                <a:solidFill>
+                  <a:schemeClr val="bg1"/>
+                </a:solidFill>
+                <a:latin typeface="Gill Sans MT" charset="0"/>
+                <a:ea typeface="Gill Sans MT" charset="0"/>
+                <a:cs typeface="Gill Sans MT" charset="0"/>
+              </a:rPr>
+              <a:t>Std</a:t>
+            </a:r>
+            <a:r>
+              <a:rPr lang="en-US" sz="1700" dirty="0" smtClean="0">
+                <a:solidFill>
+                  <a:schemeClr val="bg1"/>
+                </a:solidFill>
+                <a:latin typeface="Gill Sans MT" charset="0"/>
+                <a:ea typeface="Gill Sans MT" charset="0"/>
+                <a:cs typeface="Gill Sans MT" charset="0"/>
+              </a:rPr>
+              <a:t>: 2.126 </a:t>
+            </a:r>
+            <a:endParaRPr lang="en-US" sz="1700" dirty="0">
+              <a:solidFill>
+                <a:schemeClr val="bg1"/>
+              </a:solidFill>
+              <a:latin typeface="Gill Sans MT" charset="0"/>
+              <a:ea typeface="Gill Sans MT" charset="0"/>
+              <a:cs typeface="Gill Sans MT" charset="0"/>
+            </a:endParaRPr>
+          </a:p>
+        </p:txBody>
+      </p:sp>
+      <p:sp>
+        <p:nvSpPr>
+          <p:cNvPr id="70" name="TextBox 69"/>
+          <p:cNvSpPr txBox="1"/>
+          <p:nvPr/>
+        </p:nvSpPr>
+        <p:spPr>
+          <a:xfrm>
+            <a:off x="21317704" y="10452928"/>
+            <a:ext cx="5220814" cy="353943"/>
+          </a:xfrm>
+          <a:prstGeom prst="rect">
+            <a:avLst/>
+          </a:prstGeom>
+          <a:noFill/>
+        </p:spPr>
+        <p:txBody>
+          <a:bodyPr wrap="square" rtlCol="0">
+            <a:spAutoFit/>
+          </a:bodyPr>
+          <a:lstStyle/>
+          <a:p>
+            <a:r>
+              <a:rPr lang="en-US" sz="1700" dirty="0" smtClean="0">
+                <a:solidFill>
+                  <a:schemeClr val="bg1"/>
+                </a:solidFill>
+                <a:latin typeface="Gill Sans MT" charset="0"/>
+                <a:ea typeface="Gill Sans MT" charset="0"/>
+                <a:cs typeface="Gill Sans MT" charset="0"/>
+              </a:rPr>
+              <a:t>Mean: 4.891                                                   </a:t>
+            </a:r>
+            <a:r>
+              <a:rPr lang="en-US" sz="1700" dirty="0" err="1" smtClean="0">
+                <a:solidFill>
+                  <a:schemeClr val="bg1"/>
+                </a:solidFill>
+                <a:latin typeface="Gill Sans MT" charset="0"/>
+                <a:ea typeface="Gill Sans MT" charset="0"/>
+                <a:cs typeface="Gill Sans MT" charset="0"/>
+              </a:rPr>
+              <a:t>Std</a:t>
+            </a:r>
+            <a:r>
+              <a:rPr lang="en-US" sz="1700" dirty="0" smtClean="0">
+                <a:solidFill>
+                  <a:schemeClr val="bg1"/>
+                </a:solidFill>
+                <a:latin typeface="Gill Sans MT" charset="0"/>
+                <a:ea typeface="Gill Sans MT" charset="0"/>
+                <a:cs typeface="Gill Sans MT" charset="0"/>
+              </a:rPr>
+              <a:t>: 2.362 </a:t>
+            </a:r>
+            <a:endParaRPr lang="en-US" sz="1700" dirty="0">
+              <a:solidFill>
+                <a:schemeClr val="bg1"/>
+              </a:solidFill>
+              <a:latin typeface="Gill Sans MT" charset="0"/>
+              <a:ea typeface="Gill Sans MT" charset="0"/>
+              <a:cs typeface="Gill Sans MT" charset="0"/>
+            </a:endParaRPr>
+          </a:p>
+        </p:txBody>
+      </p:sp>
     </p:spTree>
   </p:cSld>
   <p:clrMapOvr>

</xml_diff>